<commit_message>
Testergebnisse für mut_wk und cro_wk / Bilder für Präsentation
</commit_message>
<xml_diff>
--- a/Präsentation/BMO_Genetischer_Algorithmus_JKM.pptx
+++ b/Präsentation/BMO_Genetischer_Algorithmus_JKM.pptx
@@ -5,7 +5,7 @@
     <p:sldMasterId id="2147483732" r:id="rId1"/>
   </p:sldMasterIdLst>
   <p:notesMasterIdLst>
-    <p:notesMasterId r:id="rId21"/>
+    <p:notesMasterId r:id="rId23"/>
   </p:notesMasterIdLst>
   <p:sldIdLst>
     <p:sldId id="256" r:id="rId2"/>
@@ -26,7 +26,9 @@
     <p:sldId id="284" r:id="rId17"/>
     <p:sldId id="289" r:id="rId18"/>
     <p:sldId id="290" r:id="rId19"/>
-    <p:sldId id="286" r:id="rId20"/>
+    <p:sldId id="292" r:id="rId20"/>
+    <p:sldId id="291" r:id="rId21"/>
+    <p:sldId id="286" r:id="rId22"/>
   </p:sldIdLst>
   <p:sldSz cx="12192000" cy="6858000"/>
   <p:notesSz cx="6858000" cy="9144000"/>
@@ -219,7 +221,7 @@
           <a:p>
             <a:fld id="{B80D74FE-0842-43F5-8748-38C4A07252C4}" type="datetimeFigureOut">
               <a:rPr lang="de-DE" smtClean="0"/>
-              <a:t>17.01.2018</a:t>
+              <a:t>18.01.2018</a:t>
             </a:fld>
             <a:endParaRPr lang="de-DE"/>
           </a:p>
@@ -712,7 +714,7 @@
           <a:p>
             <a:fld id="{4E3DB4C1-83B2-46EE-B3DB-315BD3BA9EBF}" type="datetime1">
               <a:rPr lang="de-DE" smtClean="0"/>
-              <a:t>17.01.2018</a:t>
+              <a:t>18.01.2018</a:t>
             </a:fld>
             <a:endParaRPr lang="de-DE"/>
           </a:p>
@@ -923,7 +925,7 @@
           <a:p>
             <a:fld id="{CACEBC38-88A3-4577-896C-B3FEE8C7E5FF}" type="datetime1">
               <a:rPr lang="de-DE" smtClean="0"/>
-              <a:t>17.01.2018</a:t>
+              <a:t>18.01.2018</a:t>
             </a:fld>
             <a:endParaRPr lang="de-DE"/>
           </a:p>
@@ -1182,7 +1184,7 @@
           <a:p>
             <a:fld id="{65671B67-B038-45DC-802B-A8D243EE20F3}" type="datetime1">
               <a:rPr lang="de-DE" smtClean="0"/>
-              <a:t>17.01.2018</a:t>
+              <a:t>18.01.2018</a:t>
             </a:fld>
             <a:endParaRPr lang="de-DE"/>
           </a:p>
@@ -1355,7 +1357,7 @@
           <a:p>
             <a:fld id="{FDB7A1E7-C9E2-4853-B007-E822659563EF}" type="datetime1">
               <a:rPr lang="de-DE" smtClean="0"/>
-              <a:t>17.01.2018</a:t>
+              <a:t>18.01.2018</a:t>
             </a:fld>
             <a:endParaRPr lang="de-DE"/>
           </a:p>
@@ -1701,7 +1703,7 @@
           <a:p>
             <a:fld id="{BFE9A41E-9BF9-4EA9-963E-791B91409D1A}" type="datetime1">
               <a:rPr lang="de-DE" smtClean="0"/>
-              <a:t>17.01.2018</a:t>
+              <a:t>18.01.2018</a:t>
             </a:fld>
             <a:endParaRPr lang="de-DE"/>
           </a:p>
@@ -1979,7 +1981,7 @@
           <a:p>
             <a:fld id="{0362392C-C887-48AF-8B4F-E9A3F0D511C4}" type="datetime1">
               <a:rPr lang="de-DE" smtClean="0"/>
-              <a:t>17.01.2018</a:t>
+              <a:t>18.01.2018</a:t>
             </a:fld>
             <a:endParaRPr lang="de-DE"/>
           </a:p>
@@ -2361,7 +2363,7 @@
           <a:p>
             <a:fld id="{AD6789F1-B323-4840-AE81-A79D3FBF8E14}" type="datetime1">
               <a:rPr lang="de-DE" smtClean="0"/>
-              <a:t>17.01.2018</a:t>
+              <a:t>18.01.2018</a:t>
             </a:fld>
             <a:endParaRPr lang="de-DE"/>
           </a:p>
@@ -2482,7 +2484,7 @@
           <a:p>
             <a:fld id="{EC6EC868-2ABE-401E-BF2B-661DA6C6FC5E}" type="datetime1">
               <a:rPr lang="de-DE" smtClean="0"/>
-              <a:t>17.01.2018</a:t>
+              <a:t>18.01.2018</a:t>
             </a:fld>
             <a:endParaRPr lang="de-DE"/>
           </a:p>
@@ -2656,7 +2658,7 @@
           <a:p>
             <a:fld id="{F54817A6-C585-4AC6-802C-9FA5C187725F}" type="datetime1">
               <a:rPr lang="de-DE" smtClean="0"/>
-              <a:t>17.01.2018</a:t>
+              <a:t>18.01.2018</a:t>
             </a:fld>
             <a:endParaRPr lang="de-DE"/>
           </a:p>
@@ -3013,7 +3015,7 @@
           <a:p>
             <a:fld id="{4E082326-FA76-442B-9184-5387A637D579}" type="datetime1">
               <a:rPr lang="de-DE" smtClean="0"/>
-              <a:t>17.01.2018</a:t>
+              <a:t>18.01.2018</a:t>
             </a:fld>
             <a:endParaRPr lang="de-DE"/>
           </a:p>
@@ -3393,7 +3395,7 @@
           <a:p>
             <a:fld id="{EB825160-D0B7-48E2-B299-B9253265F1EE}" type="datetime1">
               <a:rPr lang="de-DE" smtClean="0"/>
-              <a:t>17.01.2018</a:t>
+              <a:t>18.01.2018</a:t>
             </a:fld>
             <a:endParaRPr lang="de-DE"/>
           </a:p>
@@ -3683,7 +3685,7 @@
           <a:p>
             <a:fld id="{8F768FB2-0541-41FD-BE1E-CECD6DA0281B}" type="datetime1">
               <a:rPr lang="de-DE" smtClean="0"/>
-              <a:t>17.01.2018</a:t>
+              <a:t>18.01.2018</a:t>
             </a:fld>
             <a:endParaRPr lang="de-DE"/>
           </a:p>
@@ -4510,7 +4512,7 @@
           <a:p>
             <a:fld id="{D569A928-58F6-45D5-8F78-96A6F4081ECC}" type="datetime1">
               <a:rPr lang="de-DE" sz="1200" smtClean="0"/>
-              <a:t>17.01.2018</a:t>
+              <a:t>18.01.2018</a:t>
             </a:fld>
             <a:endParaRPr lang="de-DE" dirty="0"/>
           </a:p>
@@ -4807,7 +4809,7 @@
           <a:p>
             <a:fld id="{D569A928-58F6-45D5-8F78-96A6F4081ECC}" type="datetime1">
               <a:rPr lang="de-DE" sz="1200" smtClean="0"/>
-              <a:t>17.01.2018</a:t>
+              <a:t>18.01.2018</a:t>
             </a:fld>
             <a:endParaRPr lang="de-DE" dirty="0"/>
           </a:p>
@@ -5091,7 +5093,7 @@
           <a:p>
             <a:fld id="{D569A928-58F6-45D5-8F78-96A6F4081ECC}" type="datetime1">
               <a:rPr lang="de-DE" sz="1200" smtClean="0"/>
-              <a:t>17.01.2018</a:t>
+              <a:t>18.01.2018</a:t>
             </a:fld>
             <a:endParaRPr lang="de-DE" dirty="0"/>
           </a:p>
@@ -5329,7 +5331,7 @@
           <a:p>
             <a:fld id="{8B8ED355-F95A-4BB8-9366-CDBE7FD377DF}" type="datetime1">
               <a:rPr lang="de-DE" sz="1200" smtClean="0"/>
-              <a:t>17.01.2018</a:t>
+              <a:t>18.01.2018</a:t>
             </a:fld>
             <a:endParaRPr lang="de-DE" dirty="0"/>
           </a:p>
@@ -5507,7 +5509,7 @@
           <a:p>
             <a:fld id="{D569A928-58F6-45D5-8F78-96A6F4081ECC}" type="datetime1">
               <a:rPr lang="de-DE" sz="1200" smtClean="0"/>
-              <a:t>17.01.2018</a:t>
+              <a:t>18.01.2018</a:t>
             </a:fld>
             <a:endParaRPr lang="de-DE" dirty="0"/>
           </a:p>
@@ -5720,7 +5722,7 @@
           <a:p>
             <a:fld id="{D569A928-58F6-45D5-8F78-96A6F4081ECC}" type="datetime1">
               <a:rPr lang="de-DE" sz="1200" smtClean="0"/>
-              <a:t>17.01.2018</a:t>
+              <a:t>18.01.2018</a:t>
             </a:fld>
             <a:endParaRPr lang="de-DE" dirty="0"/>
           </a:p>
@@ -6275,7 +6277,11 @@
                 <a:latin typeface="Arial" panose="020B0604020202020204" pitchFamily="34" charset="0"/>
                 <a:cs typeface="Arial" panose="020B0604020202020204" pitchFamily="34" charset="0"/>
               </a:rPr>
-              <a:t>Testergebnisse</a:t>
+              <a:t>Testergebnisse - </a:t>
+            </a:r>
+            <a:r>
+              <a:rPr lang="de-DE" dirty="0"/>
+              <a:t>Testen der Verfahren</a:t>
             </a:r>
             <a:endParaRPr lang="de-DE" cap="none" dirty="0">
               <a:solidFill>
@@ -6353,7 +6359,7 @@
           <a:p>
             <a:fld id="{D569A928-58F6-45D5-8F78-96A6F4081ECC}" type="datetime1">
               <a:rPr lang="de-DE" sz="1200" smtClean="0"/>
-              <a:t>17.01.2018</a:t>
+              <a:t>18.01.2018</a:t>
             </a:fld>
             <a:endParaRPr lang="de-DE" dirty="0"/>
           </a:p>
@@ -6375,44 +6381,478 @@
             <p:ph type="ftr" sz="quarter" idx="11"/>
           </p:nvPr>
         </p:nvSpPr>
-        <p:spPr/>
-        <p:txBody>
-          <a:bodyPr/>
-          <a:lstStyle/>
-          <a:p>
-            <a:r>
-              <a:rPr lang="de-DE" sz="1400" dirty="0"/>
-              <a:t>Johann Schröder, Kevin Penner, Michael </a:t>
-            </a:r>
-            <a:r>
-              <a:rPr lang="de-DE" sz="1400" dirty="0" err="1"/>
-              <a:t>Tuszynski</a:t>
+        <p:spPr>
+          <a:xfrm>
+            <a:off x="3686185" y="6459785"/>
+            <a:ext cx="4822804" cy="365125"/>
+          </a:xfrm>
+        </p:spPr>
+        <p:txBody>
+          <a:bodyPr/>
+          <a:lstStyle/>
+          <a:p>
+            <a:r>
+              <a:rPr lang="de-DE" sz="1400"/>
+              <a:t>Johann Schröder, Kevin Penner, Michael Tuszynski</a:t>
             </a:r>
             <a:endParaRPr lang="de-DE" sz="1400" dirty="0"/>
           </a:p>
         </p:txBody>
       </p:sp>
-      <p:sp>
-        <p:nvSpPr>
-          <p:cNvPr id="6" name="Inhaltsplatzhalter 5">
-            <a:extLst>
-              <a:ext uri="{FF2B5EF4-FFF2-40B4-BE49-F238E27FC236}">
-                <a16:creationId xmlns:a16="http://schemas.microsoft.com/office/drawing/2014/main" id="{D7A52B11-902F-47AD-A146-84986C3C5B6F}"/>
-              </a:ext>
-            </a:extLst>
-          </p:cNvPr>
-          <p:cNvSpPr>
-            <a:spLocks noGrp="1"/>
-          </p:cNvSpPr>
+      <p:pic>
+        <p:nvPicPr>
+          <p:cNvPr id="14" name="Inhaltsplatzhalter 13">
+            <a:extLst>
+              <a:ext uri="{FF2B5EF4-FFF2-40B4-BE49-F238E27FC236}">
+                <a16:creationId xmlns:a16="http://schemas.microsoft.com/office/drawing/2014/main" id="{E72EFE99-E202-4A26-835E-1C2B791BE781}"/>
+              </a:ext>
+            </a:extLst>
+          </p:cNvPr>
+          <p:cNvPicPr>
+            <a:picLocks noGrp="1" noChangeAspect="1"/>
+          </p:cNvPicPr>
           <p:nvPr>
             <p:ph idx="1"/>
           </p:nvPr>
-        </p:nvSpPr>
-        <p:spPr/>
-        <p:txBody>
-          <a:bodyPr/>
-          <a:lstStyle/>
-          <a:p>
+        </p:nvPicPr>
+        <p:blipFill rotWithShape="1">
+          <a:blip r:embed="rId2">
+            <a:extLst>
+              <a:ext uri="{28A0092B-C50C-407E-A947-70E740481C1C}">
+                <a14:useLocalDpi xmlns:a14="http://schemas.microsoft.com/office/drawing/2010/main" val="0"/>
+              </a:ext>
+            </a:extLst>
+          </a:blip>
+          <a:srcRect l="8943" r="8293"/>
+          <a:stretch/>
+        </p:blipFill>
+        <p:spPr>
+          <a:xfrm>
+            <a:off x="822959" y="1974279"/>
+            <a:ext cx="6986017" cy="4022725"/>
+          </a:xfrm>
+        </p:spPr>
+      </p:pic>
+      <p:grpSp>
+        <p:nvGrpSpPr>
+          <p:cNvPr id="26" name="Gruppieren 25">
+            <a:extLst>
+              <a:ext uri="{FF2B5EF4-FFF2-40B4-BE49-F238E27FC236}">
+                <a16:creationId xmlns:a16="http://schemas.microsoft.com/office/drawing/2014/main" id="{DE6A5A2E-FAB6-4261-89C5-CA166087456A}"/>
+              </a:ext>
+            </a:extLst>
+          </p:cNvPr>
+          <p:cNvGrpSpPr/>
+          <p:nvPr/>
+        </p:nvGrpSpPr>
+        <p:grpSpPr>
+          <a:xfrm>
+            <a:off x="1206325" y="2478024"/>
+            <a:ext cx="3960035" cy="3081528"/>
+            <a:chOff x="1206325" y="2478024"/>
+            <a:chExt cx="3960035" cy="3081528"/>
+          </a:xfrm>
+        </p:grpSpPr>
+        <p:cxnSp>
+          <p:nvCxnSpPr>
+            <p:cNvPr id="17" name="Gerader Verbinder 16">
+              <a:extLst>
+                <a:ext uri="{FF2B5EF4-FFF2-40B4-BE49-F238E27FC236}">
+                  <a16:creationId xmlns:a16="http://schemas.microsoft.com/office/drawing/2014/main" id="{E8FE33D3-5A5C-4A55-B6AB-FB3AD6EC086D}"/>
+                </a:ext>
+              </a:extLst>
+            </p:cNvPr>
+            <p:cNvCxnSpPr>
+              <a:cxnSpLocks/>
+            </p:cNvCxnSpPr>
+            <p:nvPr/>
+          </p:nvCxnSpPr>
+          <p:spPr>
+            <a:xfrm>
+              <a:off x="2532888" y="2569464"/>
+              <a:ext cx="0" cy="2990088"/>
+            </a:xfrm>
+            <a:prstGeom prst="line">
+              <a:avLst/>
+            </a:prstGeom>
+            <a:ln w="38100">
+              <a:solidFill>
+                <a:schemeClr val="tx1"/>
+              </a:solidFill>
+            </a:ln>
+          </p:spPr>
+          <p:style>
+            <a:lnRef idx="1">
+              <a:schemeClr val="accent1"/>
+            </a:lnRef>
+            <a:fillRef idx="0">
+              <a:schemeClr val="accent1"/>
+            </a:fillRef>
+            <a:effectRef idx="0">
+              <a:schemeClr val="accent1"/>
+            </a:effectRef>
+            <a:fontRef idx="minor">
+              <a:schemeClr val="tx1"/>
+            </a:fontRef>
+          </p:style>
+        </p:cxnSp>
+        <p:cxnSp>
+          <p:nvCxnSpPr>
+            <p:cNvPr id="23" name="Gerader Verbinder 22">
+              <a:extLst>
+                <a:ext uri="{FF2B5EF4-FFF2-40B4-BE49-F238E27FC236}">
+                  <a16:creationId xmlns:a16="http://schemas.microsoft.com/office/drawing/2014/main" id="{FCC84FB5-2D62-4313-90EE-D4064C1D0BC5}"/>
+                </a:ext>
+              </a:extLst>
+            </p:cNvPr>
+            <p:cNvCxnSpPr>
+              <a:cxnSpLocks/>
+            </p:cNvCxnSpPr>
+            <p:nvPr/>
+          </p:nvCxnSpPr>
+          <p:spPr>
+            <a:xfrm>
+              <a:off x="3819144" y="2569464"/>
+              <a:ext cx="0" cy="2990088"/>
+            </a:xfrm>
+            <a:prstGeom prst="line">
+              <a:avLst/>
+            </a:prstGeom>
+            <a:ln w="38100">
+              <a:solidFill>
+                <a:schemeClr val="tx1"/>
+              </a:solidFill>
+            </a:ln>
+          </p:spPr>
+          <p:style>
+            <a:lnRef idx="1">
+              <a:schemeClr val="accent1"/>
+            </a:lnRef>
+            <a:fillRef idx="0">
+              <a:schemeClr val="accent1"/>
+            </a:fillRef>
+            <a:effectRef idx="0">
+              <a:schemeClr val="accent1"/>
+            </a:effectRef>
+            <a:fontRef idx="minor">
+              <a:schemeClr val="tx1"/>
+            </a:fontRef>
+          </p:style>
+        </p:cxnSp>
+        <p:sp>
+          <p:nvSpPr>
+            <p:cNvPr id="21" name="Textfeld 20">
+              <a:extLst>
+                <a:ext uri="{FF2B5EF4-FFF2-40B4-BE49-F238E27FC236}">
+                  <a16:creationId xmlns:a16="http://schemas.microsoft.com/office/drawing/2014/main" id="{C6EB26FE-342A-4B01-81FF-86B67C521889}"/>
+                </a:ext>
+              </a:extLst>
+            </p:cNvPr>
+            <p:cNvSpPr txBox="1"/>
+            <p:nvPr/>
+          </p:nvSpPr>
+          <p:spPr>
+            <a:xfrm>
+              <a:off x="1206325" y="2478024"/>
+              <a:ext cx="1293379" cy="369332"/>
+            </a:xfrm>
+            <a:prstGeom prst="rect">
+              <a:avLst/>
+            </a:prstGeom>
+            <a:noFill/>
+          </p:spPr>
+          <p:txBody>
+            <a:bodyPr wrap="square" rtlCol="0">
+              <a:spAutoFit/>
+            </a:bodyPr>
+            <a:lstStyle/>
+            <a:p>
+              <a:pPr algn="ctr"/>
+              <a:r>
+                <a:rPr lang="de-DE" dirty="0"/>
+                <a:t>Rangbasiert</a:t>
+              </a:r>
+            </a:p>
+          </p:txBody>
+        </p:sp>
+        <p:sp>
+          <p:nvSpPr>
+            <p:cNvPr id="24" name="Textfeld 23">
+              <a:extLst>
+                <a:ext uri="{FF2B5EF4-FFF2-40B4-BE49-F238E27FC236}">
+                  <a16:creationId xmlns:a16="http://schemas.microsoft.com/office/drawing/2014/main" id="{1C3CFC21-2D67-4ADA-9D28-12DA8B299B51}"/>
+                </a:ext>
+              </a:extLst>
+            </p:cNvPr>
+            <p:cNvSpPr txBox="1"/>
+            <p:nvPr/>
+          </p:nvSpPr>
+          <p:spPr>
+            <a:xfrm>
+              <a:off x="2525765" y="2478024"/>
+              <a:ext cx="1293379" cy="369332"/>
+            </a:xfrm>
+            <a:prstGeom prst="rect">
+              <a:avLst/>
+            </a:prstGeom>
+            <a:noFill/>
+          </p:spPr>
+          <p:txBody>
+            <a:bodyPr wrap="square" rtlCol="0">
+              <a:spAutoFit/>
+            </a:bodyPr>
+            <a:lstStyle/>
+            <a:p>
+              <a:pPr algn="ctr"/>
+              <a:r>
+                <a:rPr lang="de-DE" dirty="0"/>
+                <a:t>Turnier</a:t>
+              </a:r>
+            </a:p>
+          </p:txBody>
+        </p:sp>
+        <p:sp>
+          <p:nvSpPr>
+            <p:cNvPr id="25" name="Textfeld 24">
+              <a:extLst>
+                <a:ext uri="{FF2B5EF4-FFF2-40B4-BE49-F238E27FC236}">
+                  <a16:creationId xmlns:a16="http://schemas.microsoft.com/office/drawing/2014/main" id="{EDD1E3DF-36F5-418F-ADFF-0393A070AFAB}"/>
+                </a:ext>
+              </a:extLst>
+            </p:cNvPr>
+            <p:cNvSpPr txBox="1"/>
+            <p:nvPr/>
+          </p:nvSpPr>
+          <p:spPr>
+            <a:xfrm>
+              <a:off x="3815582" y="2478024"/>
+              <a:ext cx="1350778" cy="369332"/>
+            </a:xfrm>
+            <a:prstGeom prst="rect">
+              <a:avLst/>
+            </a:prstGeom>
+            <a:noFill/>
+          </p:spPr>
+          <p:txBody>
+            <a:bodyPr wrap="square" rtlCol="0">
+              <a:spAutoFit/>
+            </a:bodyPr>
+            <a:lstStyle/>
+            <a:p>
+              <a:r>
+                <a:rPr lang="de-DE" dirty="0"/>
+                <a:t>Proportional</a:t>
+              </a:r>
+            </a:p>
+          </p:txBody>
+        </p:sp>
+      </p:grpSp>
+      <p:sp>
+        <p:nvSpPr>
+          <p:cNvPr id="27" name="Textfeld 26">
+            <a:extLst>
+              <a:ext uri="{FF2B5EF4-FFF2-40B4-BE49-F238E27FC236}">
+                <a16:creationId xmlns:a16="http://schemas.microsoft.com/office/drawing/2014/main" id="{9E363FE2-AF3C-4CEE-BA44-7D64F5B88670}"/>
+              </a:ext>
+            </a:extLst>
+          </p:cNvPr>
+          <p:cNvSpPr txBox="1"/>
+          <p:nvPr/>
+        </p:nvSpPr>
+        <p:spPr>
+          <a:xfrm>
+            <a:off x="7816099" y="2478024"/>
+            <a:ext cx="3685032" cy="2862322"/>
+          </a:xfrm>
+          <a:prstGeom prst="rect">
+            <a:avLst/>
+          </a:prstGeom>
+          <a:noFill/>
+        </p:spPr>
+        <p:txBody>
+          <a:bodyPr wrap="square" rtlCol="0">
+            <a:spAutoFit/>
+          </a:bodyPr>
+          <a:lstStyle/>
+          <a:p>
+            <a:r>
+              <a:rPr lang="de-DE" b="1" dirty="0"/>
+              <a:t>Erkenntnisse:</a:t>
+            </a:r>
+          </a:p>
+          <a:p>
+            <a:pPr marL="285750" indent="-285750">
+              <a:buFont typeface="Arial" panose="020B0604020202020204" pitchFamily="34" charset="0"/>
+              <a:buChar char="•"/>
+            </a:pPr>
+            <a:r>
+              <a:rPr lang="de-DE" dirty="0"/>
+              <a:t>Selektion ausschlaggebend für Konvergenz</a:t>
+            </a:r>
+          </a:p>
+          <a:p>
+            <a:pPr marL="285750" indent="-285750">
+              <a:buFont typeface="Arial" panose="020B0604020202020204" pitchFamily="34" charset="0"/>
+              <a:buChar char="•"/>
+            </a:pPr>
+            <a:r>
+              <a:rPr lang="de-DE" dirty="0"/>
+              <a:t>Turnierselektion </a:t>
+            </a:r>
+            <a:r>
+              <a:rPr lang="de-DE" b="1" dirty="0">
+                <a:latin typeface="Times New Roman" panose="02020603050405020304" pitchFamily="18" charset="0"/>
+                <a:cs typeface="Times New Roman" panose="02020603050405020304" pitchFamily="18" charset="0"/>
+              </a:rPr>
+              <a:t>↑</a:t>
+            </a:r>
+          </a:p>
+          <a:p>
+            <a:pPr marL="285750" indent="-285750">
+              <a:buFont typeface="Arial" panose="020B0604020202020204" pitchFamily="34" charset="0"/>
+              <a:buChar char="•"/>
+            </a:pPr>
+            <a:r>
+              <a:rPr lang="de-DE" dirty="0">
+                <a:latin typeface="Times New Roman" panose="02020603050405020304" pitchFamily="18" charset="0"/>
+                <a:cs typeface="Times New Roman" panose="02020603050405020304" pitchFamily="18" charset="0"/>
+              </a:rPr>
+              <a:t>Bei großen Suchräumen mit vielen lokalen Minima: langsames annähern an globales Minimum</a:t>
+            </a:r>
+          </a:p>
+          <a:p>
+            <a:pPr marL="285750" indent="-285750">
+              <a:buFont typeface="Arial" panose="020B0604020202020204" pitchFamily="34" charset="0"/>
+              <a:buChar char="•"/>
+            </a:pPr>
+            <a:r>
+              <a:rPr lang="de-DE" dirty="0">
+                <a:latin typeface="Times New Roman" panose="02020603050405020304" pitchFamily="18" charset="0"/>
+                <a:cs typeface="Times New Roman" panose="02020603050405020304" pitchFamily="18" charset="0"/>
+                <a:sym typeface="Wingdings" panose="05000000000000000000" pitchFamily="2" charset="2"/>
+              </a:rPr>
+              <a:t> Ab gewisser Genauigkeit: Andere Methode (z.B. </a:t>
+            </a:r>
+            <a:r>
+              <a:rPr lang="de-DE" dirty="0" err="1">
+                <a:latin typeface="Times New Roman" panose="02020603050405020304" pitchFamily="18" charset="0"/>
+                <a:cs typeface="Times New Roman" panose="02020603050405020304" pitchFamily="18" charset="0"/>
+                <a:sym typeface="Wingdings" panose="05000000000000000000" pitchFamily="2" charset="2"/>
+              </a:rPr>
+              <a:t>Gradientenabstiegsverfahren</a:t>
+            </a:r>
+            <a:r>
+              <a:rPr lang="de-DE" dirty="0">
+                <a:latin typeface="Times New Roman" panose="02020603050405020304" pitchFamily="18" charset="0"/>
+                <a:cs typeface="Times New Roman" panose="02020603050405020304" pitchFamily="18" charset="0"/>
+                <a:sym typeface="Wingdings" panose="05000000000000000000" pitchFamily="2" charset="2"/>
+              </a:rPr>
+              <a:t>)</a:t>
+            </a:r>
+            <a:endParaRPr lang="de-DE" dirty="0"/>
+          </a:p>
+        </p:txBody>
+      </p:sp>
+      <p:sp>
+        <p:nvSpPr>
+          <p:cNvPr id="28" name="Ellipse 27">
+            <a:extLst>
+              <a:ext uri="{FF2B5EF4-FFF2-40B4-BE49-F238E27FC236}">
+                <a16:creationId xmlns:a16="http://schemas.microsoft.com/office/drawing/2014/main" id="{65F7AE4B-0F17-4529-A932-37E7F217A835}"/>
+              </a:ext>
+            </a:extLst>
+          </p:cNvPr>
+          <p:cNvSpPr/>
+          <p:nvPr/>
+        </p:nvSpPr>
+        <p:spPr>
+          <a:xfrm rot="16200000">
+            <a:off x="2514728" y="3273676"/>
+            <a:ext cx="758700" cy="137163"/>
+          </a:xfrm>
+          <a:prstGeom prst="ellipse">
+            <a:avLst/>
+          </a:prstGeom>
+          <a:noFill/>
+          <a:ln>
+            <a:solidFill>
+              <a:srgbClr val="FF0000"/>
+            </a:solidFill>
+          </a:ln>
+        </p:spPr>
+        <p:style>
+          <a:lnRef idx="2">
+            <a:schemeClr val="accent1">
+              <a:shade val="50000"/>
+            </a:schemeClr>
+          </a:lnRef>
+          <a:fillRef idx="1">
+            <a:schemeClr val="accent1"/>
+          </a:fillRef>
+          <a:effectRef idx="0">
+            <a:schemeClr val="accent1"/>
+          </a:effectRef>
+          <a:fontRef idx="minor">
+            <a:schemeClr val="lt1"/>
+          </a:fontRef>
+        </p:style>
+        <p:txBody>
+          <a:bodyPr rtlCol="0" anchor="ctr"/>
+          <a:lstStyle/>
+          <a:p>
+            <a:pPr algn="ctr"/>
+            <a:endParaRPr lang="de-DE"/>
+          </a:p>
+        </p:txBody>
+      </p:sp>
+      <p:sp>
+        <p:nvSpPr>
+          <p:cNvPr id="29" name="Ellipse 28">
+            <a:extLst>
+              <a:ext uri="{FF2B5EF4-FFF2-40B4-BE49-F238E27FC236}">
+                <a16:creationId xmlns:a16="http://schemas.microsoft.com/office/drawing/2014/main" id="{79DDE0EF-A637-4700-BA81-770E4E44F45C}"/>
+              </a:ext>
+            </a:extLst>
+          </p:cNvPr>
+          <p:cNvSpPr/>
+          <p:nvPr/>
+        </p:nvSpPr>
+        <p:spPr>
+          <a:xfrm rot="10800000">
+            <a:off x="5166359" y="3964100"/>
+            <a:ext cx="2459736" cy="159844"/>
+          </a:xfrm>
+          <a:prstGeom prst="ellipse">
+            <a:avLst/>
+          </a:prstGeom>
+          <a:noFill/>
+          <a:ln>
+            <a:solidFill>
+              <a:srgbClr val="FF0000"/>
+            </a:solidFill>
+          </a:ln>
+        </p:spPr>
+        <p:style>
+          <a:lnRef idx="2">
+            <a:schemeClr val="accent1">
+              <a:shade val="50000"/>
+            </a:schemeClr>
+          </a:lnRef>
+          <a:fillRef idx="1">
+            <a:schemeClr val="accent1"/>
+          </a:fillRef>
+          <a:effectRef idx="0">
+            <a:schemeClr val="accent1"/>
+          </a:effectRef>
+          <a:fontRef idx="minor">
+            <a:schemeClr val="lt1"/>
+          </a:fontRef>
+        </p:style>
+        <p:txBody>
+          <a:bodyPr rtlCol="0" anchor="ctr"/>
+          <a:lstStyle/>
+          <a:p>
+            <a:pPr algn="ctr"/>
             <a:endParaRPr lang="de-DE"/>
           </a:p>
         </p:txBody>
@@ -6427,6 +6867,157 @@
   <p:clrMapOvr>
     <a:masterClrMapping/>
   </p:clrMapOvr>
+  <p:timing>
+    <p:tnLst>
+      <p:par>
+        <p:cTn id="1" dur="indefinite" restart="never" nodeType="tmRoot">
+          <p:childTnLst>
+            <p:seq concurrent="1" nextAc="seek">
+              <p:cTn id="2" dur="indefinite" nodeType="mainSeq">
+                <p:childTnLst>
+                  <p:par>
+                    <p:cTn id="3" fill="hold">
+                      <p:stCondLst>
+                        <p:cond delay="indefinite"/>
+                      </p:stCondLst>
+                      <p:childTnLst>
+                        <p:par>
+                          <p:cTn id="4" fill="hold">
+                            <p:stCondLst>
+                              <p:cond delay="0"/>
+                            </p:stCondLst>
+                            <p:childTnLst>
+                              <p:par>
+                                <p:cTn id="5" presetID="1" presetClass="entr" presetSubtype="0" fill="hold" nodeType="clickEffect">
+                                  <p:stCondLst>
+                                    <p:cond delay="0"/>
+                                  </p:stCondLst>
+                                  <p:childTnLst>
+                                    <p:set>
+                                      <p:cBhvr>
+                                        <p:cTn id="6" dur="1" fill="hold">
+                                          <p:stCondLst>
+                                            <p:cond delay="0"/>
+                                          </p:stCondLst>
+                                        </p:cTn>
+                                        <p:tgtEl>
+                                          <p:spTgt spid="26"/>
+                                        </p:tgtEl>
+                                        <p:attrNameLst>
+                                          <p:attrName>style.visibility</p:attrName>
+                                        </p:attrNameLst>
+                                      </p:cBhvr>
+                                      <p:to>
+                                        <p:strVal val="visible"/>
+                                      </p:to>
+                                    </p:set>
+                                  </p:childTnLst>
+                                </p:cTn>
+                              </p:par>
+                            </p:childTnLst>
+                          </p:cTn>
+                        </p:par>
+                      </p:childTnLst>
+                    </p:cTn>
+                  </p:par>
+                  <p:par>
+                    <p:cTn id="7" fill="hold">
+                      <p:stCondLst>
+                        <p:cond delay="indefinite"/>
+                      </p:stCondLst>
+                      <p:childTnLst>
+                        <p:par>
+                          <p:cTn id="8" fill="hold">
+                            <p:stCondLst>
+                              <p:cond delay="0"/>
+                            </p:stCondLst>
+                            <p:childTnLst>
+                              <p:par>
+                                <p:cTn id="9" presetID="1" presetClass="entr" presetSubtype="0" fill="hold" grpId="0" nodeType="clickEffect">
+                                  <p:stCondLst>
+                                    <p:cond delay="0"/>
+                                  </p:stCondLst>
+                                  <p:childTnLst>
+                                    <p:set>
+                                      <p:cBhvr>
+                                        <p:cTn id="10" dur="1" fill="hold">
+                                          <p:stCondLst>
+                                            <p:cond delay="0"/>
+                                          </p:stCondLst>
+                                        </p:cTn>
+                                        <p:tgtEl>
+                                          <p:spTgt spid="29"/>
+                                        </p:tgtEl>
+                                        <p:attrNameLst>
+                                          <p:attrName>style.visibility</p:attrName>
+                                        </p:attrNameLst>
+                                      </p:cBhvr>
+                                      <p:to>
+                                        <p:strVal val="visible"/>
+                                      </p:to>
+                                    </p:set>
+                                  </p:childTnLst>
+                                </p:cTn>
+                              </p:par>
+                              <p:par>
+                                <p:cTn id="11" presetID="1" presetClass="entr" presetSubtype="0" fill="hold" grpId="0" nodeType="withEffect">
+                                  <p:stCondLst>
+                                    <p:cond delay="0"/>
+                                  </p:stCondLst>
+                                  <p:childTnLst>
+                                    <p:set>
+                                      <p:cBhvr>
+                                        <p:cTn id="12" dur="1" fill="hold">
+                                          <p:stCondLst>
+                                            <p:cond delay="0"/>
+                                          </p:stCondLst>
+                                        </p:cTn>
+                                        <p:tgtEl>
+                                          <p:spTgt spid="28"/>
+                                        </p:tgtEl>
+                                        <p:attrNameLst>
+                                          <p:attrName>style.visibility</p:attrName>
+                                        </p:attrNameLst>
+                                      </p:cBhvr>
+                                      <p:to>
+                                        <p:strVal val="visible"/>
+                                      </p:to>
+                                    </p:set>
+                                  </p:childTnLst>
+                                </p:cTn>
+                              </p:par>
+                            </p:childTnLst>
+                          </p:cTn>
+                        </p:par>
+                      </p:childTnLst>
+                    </p:cTn>
+                  </p:par>
+                </p:childTnLst>
+              </p:cTn>
+              <p:prevCondLst>
+                <p:cond evt="onPrev" delay="0">
+                  <p:tgtEl>
+                    <p:sldTgt/>
+                  </p:tgtEl>
+                </p:cond>
+              </p:prevCondLst>
+              <p:nextCondLst>
+                <p:cond evt="onNext" delay="0">
+                  <p:tgtEl>
+                    <p:sldTgt/>
+                  </p:tgtEl>
+                </p:cond>
+              </p:nextCondLst>
+            </p:seq>
+          </p:childTnLst>
+        </p:cTn>
+      </p:par>
+    </p:tnLst>
+    <p:bldLst>
+      <p:bldP spid="28" grpId="0" animBg="1"/>
+      <p:bldP spid="29" grpId="0" animBg="1"/>
+    </p:bldLst>
+  </p:timing>
 </p:sld>
 </file>
 
@@ -6447,6 +7038,41 @@
           <a:chExt cx="0" cy="0"/>
         </a:xfrm>
       </p:grpSpPr>
+      <p:pic>
+        <p:nvPicPr>
+          <p:cNvPr id="27" name="Grafik 26">
+            <a:extLst>
+              <a:ext uri="{FF2B5EF4-FFF2-40B4-BE49-F238E27FC236}">
+                <a16:creationId xmlns:a16="http://schemas.microsoft.com/office/drawing/2014/main" id="{CDE8E77B-0F66-4B6D-BE36-4AD7F0AC73C0}"/>
+              </a:ext>
+            </a:extLst>
+          </p:cNvPr>
+          <p:cNvPicPr>
+            <a:picLocks noChangeAspect="1"/>
+          </p:cNvPicPr>
+          <p:nvPr/>
+        </p:nvPicPr>
+        <p:blipFill rotWithShape="1">
+          <a:blip r:embed="rId2">
+            <a:extLst>
+              <a:ext uri="{28A0092B-C50C-407E-A947-70E740481C1C}">
+                <a14:useLocalDpi xmlns:a14="http://schemas.microsoft.com/office/drawing/2010/main" val="0"/>
+              </a:ext>
+            </a:extLst>
+          </a:blip>
+          <a:srcRect l="8963" t="2019" r="8549" b="3309"/>
+          <a:stretch/>
+        </p:blipFill>
+        <p:spPr>
+          <a:xfrm>
+            <a:off x="6364223" y="4201732"/>
+            <a:ext cx="3672841" cy="2008901"/>
+          </a:xfrm>
+          <a:prstGeom prst="rect">
+            <a:avLst/>
+          </a:prstGeom>
+        </p:spPr>
+      </p:pic>
       <p:sp>
         <p:nvSpPr>
           <p:cNvPr id="2" name="Titel 1">
@@ -6478,7 +7104,11 @@
                 <a:latin typeface="Arial" panose="020B0604020202020204" pitchFamily="34" charset="0"/>
                 <a:cs typeface="Arial" panose="020B0604020202020204" pitchFamily="34" charset="0"/>
               </a:rPr>
-              <a:t>Testergebnisse</a:t>
+              <a:t>Testergebnisse - </a:t>
+            </a:r>
+            <a:r>
+              <a:rPr lang="de-DE" dirty="0"/>
+              <a:t>Testen der Verfahren</a:t>
             </a:r>
             <a:endParaRPr lang="de-DE" cap="none" dirty="0">
               <a:solidFill>
@@ -6556,7 +7186,7 @@
           <a:p>
             <a:fld id="{D569A928-58F6-45D5-8F78-96A6F4081ECC}" type="datetime1">
               <a:rPr lang="de-DE" sz="1200" smtClean="0"/>
-              <a:t>17.01.2018</a:t>
+              <a:t>18.01.2018</a:t>
             </a:fld>
             <a:endParaRPr lang="de-DE" dirty="0"/>
           </a:p>
@@ -6595,31 +7225,282 @@
           </a:p>
         </p:txBody>
       </p:sp>
-      <p:sp>
-        <p:nvSpPr>
-          <p:cNvPr id="6" name="Inhaltsplatzhalter 5">
-            <a:extLst>
-              <a:ext uri="{FF2B5EF4-FFF2-40B4-BE49-F238E27FC236}">
-                <a16:creationId xmlns:a16="http://schemas.microsoft.com/office/drawing/2014/main" id="{D7A52B11-902F-47AD-A146-84986C3C5B6F}"/>
-              </a:ext>
-            </a:extLst>
-          </p:cNvPr>
-          <p:cNvSpPr>
-            <a:spLocks noGrp="1"/>
-          </p:cNvSpPr>
+      <p:pic>
+        <p:nvPicPr>
+          <p:cNvPr id="8" name="Inhaltsplatzhalter 7">
+            <a:extLst>
+              <a:ext uri="{FF2B5EF4-FFF2-40B4-BE49-F238E27FC236}">
+                <a16:creationId xmlns:a16="http://schemas.microsoft.com/office/drawing/2014/main" id="{2D45FEDF-382A-45C2-9B9A-DA94AA9EEC30}"/>
+              </a:ext>
+            </a:extLst>
+          </p:cNvPr>
+          <p:cNvPicPr>
+            <a:picLocks noGrp="1" noChangeAspect="1"/>
+          </p:cNvPicPr>
           <p:nvPr>
             <p:ph idx="1"/>
           </p:nvPr>
-        </p:nvSpPr>
-        <p:spPr/>
-        <p:txBody>
-          <a:bodyPr/>
-          <a:lstStyle/>
-          <a:p>
-            <a:endParaRPr lang="de-DE"/>
-          </a:p>
-        </p:txBody>
-      </p:sp>
+        </p:nvPicPr>
+        <p:blipFill rotWithShape="1">
+          <a:blip r:embed="rId3">
+            <a:extLst>
+              <a:ext uri="{28A0092B-C50C-407E-A947-70E740481C1C}">
+                <a14:useLocalDpi xmlns:a14="http://schemas.microsoft.com/office/drawing/2010/main" val="0"/>
+              </a:ext>
+            </a:extLst>
+          </a:blip>
+          <a:srcRect l="8583" r="8009"/>
+          <a:stretch/>
+        </p:blipFill>
+        <p:spPr>
+          <a:xfrm>
+            <a:off x="1517904" y="1780026"/>
+            <a:ext cx="4087368" cy="2335444"/>
+          </a:xfrm>
+        </p:spPr>
+      </p:pic>
+      <p:pic>
+        <p:nvPicPr>
+          <p:cNvPr id="12" name="Grafik 11">
+            <a:extLst>
+              <a:ext uri="{FF2B5EF4-FFF2-40B4-BE49-F238E27FC236}">
+                <a16:creationId xmlns:a16="http://schemas.microsoft.com/office/drawing/2014/main" id="{15D82ABC-63F5-49B8-8AB1-AB96ED4B5EEF}"/>
+              </a:ext>
+            </a:extLst>
+          </p:cNvPr>
+          <p:cNvPicPr>
+            <a:picLocks noChangeAspect="1"/>
+          </p:cNvPicPr>
+          <p:nvPr/>
+        </p:nvPicPr>
+        <p:blipFill rotWithShape="1">
+          <a:blip r:embed="rId4">
+            <a:extLst>
+              <a:ext uri="{28A0092B-C50C-407E-A947-70E740481C1C}">
+                <a14:useLocalDpi xmlns:a14="http://schemas.microsoft.com/office/drawing/2010/main" val="0"/>
+              </a:ext>
+            </a:extLst>
+          </a:blip>
+          <a:srcRect l="8374" r="6701"/>
+          <a:stretch/>
+        </p:blipFill>
+        <p:spPr>
+          <a:xfrm>
+            <a:off x="6364223" y="2029890"/>
+            <a:ext cx="3716479" cy="2085580"/>
+          </a:xfrm>
+          <a:prstGeom prst="rect">
+            <a:avLst/>
+          </a:prstGeom>
+        </p:spPr>
+      </p:pic>
+      <p:pic>
+        <p:nvPicPr>
+          <p:cNvPr id="14" name="Grafik 13">
+            <a:extLst>
+              <a:ext uri="{FF2B5EF4-FFF2-40B4-BE49-F238E27FC236}">
+                <a16:creationId xmlns:a16="http://schemas.microsoft.com/office/drawing/2014/main" id="{DE5A8792-A4DD-461D-B096-39E2BD0A2914}"/>
+              </a:ext>
+            </a:extLst>
+          </p:cNvPr>
+          <p:cNvPicPr>
+            <a:picLocks noChangeAspect="1"/>
+          </p:cNvPicPr>
+          <p:nvPr/>
+        </p:nvPicPr>
+        <p:blipFill rotWithShape="1">
+          <a:blip r:embed="rId5">
+            <a:extLst>
+              <a:ext uri="{28A0092B-C50C-407E-A947-70E740481C1C}">
+                <a14:useLocalDpi xmlns:a14="http://schemas.microsoft.com/office/drawing/2010/main" val="0"/>
+              </a:ext>
+            </a:extLst>
+          </a:blip>
+          <a:srcRect l="8677" r="7006" b="2949"/>
+          <a:stretch/>
+        </p:blipFill>
+        <p:spPr>
+          <a:xfrm>
+            <a:off x="1536192" y="4067247"/>
+            <a:ext cx="4087368" cy="2242114"/>
+          </a:xfrm>
+          <a:prstGeom prst="rect">
+            <a:avLst/>
+          </a:prstGeom>
+        </p:spPr>
+      </p:pic>
+      <p:cxnSp>
+        <p:nvCxnSpPr>
+          <p:cNvPr id="17" name="Gerader Verbinder 16">
+            <a:extLst>
+              <a:ext uri="{FF2B5EF4-FFF2-40B4-BE49-F238E27FC236}">
+                <a16:creationId xmlns:a16="http://schemas.microsoft.com/office/drawing/2014/main" id="{1F60B0B0-897D-47B9-960E-0EB147D7A67B}"/>
+              </a:ext>
+            </a:extLst>
+          </p:cNvPr>
+          <p:cNvCxnSpPr>
+            <a:cxnSpLocks/>
+          </p:cNvCxnSpPr>
+          <p:nvPr/>
+        </p:nvCxnSpPr>
+        <p:spPr>
+          <a:xfrm>
+            <a:off x="2527135" y="2112264"/>
+            <a:ext cx="0" cy="4014216"/>
+          </a:xfrm>
+          <a:prstGeom prst="line">
+            <a:avLst/>
+          </a:prstGeom>
+          <a:ln w="19050">
+            <a:solidFill>
+              <a:schemeClr val="tx1"/>
+            </a:solidFill>
+          </a:ln>
+        </p:spPr>
+        <p:style>
+          <a:lnRef idx="1">
+            <a:schemeClr val="accent1"/>
+          </a:lnRef>
+          <a:fillRef idx="0">
+            <a:schemeClr val="accent1"/>
+          </a:fillRef>
+          <a:effectRef idx="0">
+            <a:schemeClr val="accent1"/>
+          </a:effectRef>
+          <a:fontRef idx="minor">
+            <a:schemeClr val="tx1"/>
+          </a:fontRef>
+        </p:style>
+      </p:cxnSp>
+      <p:cxnSp>
+        <p:nvCxnSpPr>
+          <p:cNvPr id="19" name="Gerader Verbinder 18">
+            <a:extLst>
+              <a:ext uri="{FF2B5EF4-FFF2-40B4-BE49-F238E27FC236}">
+                <a16:creationId xmlns:a16="http://schemas.microsoft.com/office/drawing/2014/main" id="{FA8BFBFC-4AC5-45A1-96DD-F41097DE67EB}"/>
+              </a:ext>
+            </a:extLst>
+          </p:cNvPr>
+          <p:cNvCxnSpPr>
+            <a:cxnSpLocks/>
+          </p:cNvCxnSpPr>
+          <p:nvPr/>
+        </p:nvCxnSpPr>
+        <p:spPr>
+          <a:xfrm>
+            <a:off x="3264751" y="2108362"/>
+            <a:ext cx="0" cy="4014216"/>
+          </a:xfrm>
+          <a:prstGeom prst="line">
+            <a:avLst/>
+          </a:prstGeom>
+          <a:ln w="19050">
+            <a:solidFill>
+              <a:schemeClr val="tx1"/>
+            </a:solidFill>
+          </a:ln>
+        </p:spPr>
+        <p:style>
+          <a:lnRef idx="1">
+            <a:schemeClr val="accent1"/>
+          </a:lnRef>
+          <a:fillRef idx="0">
+            <a:schemeClr val="accent1"/>
+          </a:fillRef>
+          <a:effectRef idx="0">
+            <a:schemeClr val="accent1"/>
+          </a:effectRef>
+          <a:fontRef idx="minor">
+            <a:schemeClr val="tx1"/>
+          </a:fontRef>
+        </p:style>
+      </p:cxnSp>
+      <p:cxnSp>
+        <p:nvCxnSpPr>
+          <p:cNvPr id="20" name="Gerader Verbinder 19">
+            <a:extLst>
+              <a:ext uri="{FF2B5EF4-FFF2-40B4-BE49-F238E27FC236}">
+                <a16:creationId xmlns:a16="http://schemas.microsoft.com/office/drawing/2014/main" id="{E5D91867-F15E-4547-A0ED-E7D49FDD8EE2}"/>
+              </a:ext>
+            </a:extLst>
+          </p:cNvPr>
+          <p:cNvCxnSpPr>
+            <a:cxnSpLocks/>
+          </p:cNvCxnSpPr>
+          <p:nvPr/>
+        </p:nvCxnSpPr>
+        <p:spPr>
+          <a:xfrm>
+            <a:off x="7269823" y="2295145"/>
+            <a:ext cx="0" cy="3758183"/>
+          </a:xfrm>
+          <a:prstGeom prst="line">
+            <a:avLst/>
+          </a:prstGeom>
+          <a:ln w="19050">
+            <a:solidFill>
+              <a:schemeClr val="tx1"/>
+            </a:solidFill>
+          </a:ln>
+        </p:spPr>
+        <p:style>
+          <a:lnRef idx="1">
+            <a:schemeClr val="accent1"/>
+          </a:lnRef>
+          <a:fillRef idx="0">
+            <a:schemeClr val="accent1"/>
+          </a:fillRef>
+          <a:effectRef idx="0">
+            <a:schemeClr val="accent1"/>
+          </a:effectRef>
+          <a:fontRef idx="minor">
+            <a:schemeClr val="tx1"/>
+          </a:fontRef>
+        </p:style>
+      </p:cxnSp>
+      <p:cxnSp>
+        <p:nvCxnSpPr>
+          <p:cNvPr id="23" name="Gerader Verbinder 22">
+            <a:extLst>
+              <a:ext uri="{FF2B5EF4-FFF2-40B4-BE49-F238E27FC236}">
+                <a16:creationId xmlns:a16="http://schemas.microsoft.com/office/drawing/2014/main" id="{C12F1A3D-89D4-47EC-8CA4-29CF6039496A}"/>
+              </a:ext>
+            </a:extLst>
+          </p:cNvPr>
+          <p:cNvCxnSpPr>
+            <a:cxnSpLocks/>
+          </p:cNvCxnSpPr>
+          <p:nvPr/>
+        </p:nvCxnSpPr>
+        <p:spPr>
+          <a:xfrm>
+            <a:off x="7934287" y="2291243"/>
+            <a:ext cx="0" cy="3758183"/>
+          </a:xfrm>
+          <a:prstGeom prst="line">
+            <a:avLst/>
+          </a:prstGeom>
+          <a:ln w="19050">
+            <a:solidFill>
+              <a:schemeClr val="tx1"/>
+            </a:solidFill>
+          </a:ln>
+        </p:spPr>
+        <p:style>
+          <a:lnRef idx="1">
+            <a:schemeClr val="accent1"/>
+          </a:lnRef>
+          <a:fillRef idx="0">
+            <a:schemeClr val="accent1"/>
+          </a:fillRef>
+          <a:effectRef idx="0">
+            <a:schemeClr val="accent1"/>
+          </a:effectRef>
+          <a:fontRef idx="minor">
+            <a:schemeClr val="tx1"/>
+          </a:fontRef>
+        </p:style>
+      </p:cxnSp>
     </p:spTree>
     <p:extLst>
       <p:ext uri="{BB962C8B-B14F-4D97-AF65-F5344CB8AC3E}">
@@ -6681,7 +7562,11 @@
                 <a:latin typeface="Arial" panose="020B0604020202020204" pitchFamily="34" charset="0"/>
                 <a:cs typeface="Arial" panose="020B0604020202020204" pitchFamily="34" charset="0"/>
               </a:rPr>
-              <a:t>Testergebnisse</a:t>
+              <a:t>Testergebnisse - </a:t>
+            </a:r>
+            <a:r>
+              <a:rPr lang="de-DE" dirty="0"/>
+              <a:t>Testen der Verfahren</a:t>
             </a:r>
             <a:endParaRPr lang="de-DE" cap="none" dirty="0">
               <a:solidFill>
@@ -6759,7 +7644,7 @@
           <a:p>
             <a:fld id="{D569A928-58F6-45D5-8F78-96A6F4081ECC}" type="datetime1">
               <a:rPr lang="de-DE" sz="1200" smtClean="0"/>
-              <a:t>17.01.2018</a:t>
+              <a:t>18.01.2018</a:t>
             </a:fld>
             <a:endParaRPr lang="de-DE" dirty="0"/>
           </a:p>
@@ -6798,28 +7683,289 @@
           </a:p>
         </p:txBody>
       </p:sp>
-      <p:sp>
-        <p:nvSpPr>
-          <p:cNvPr id="6" name="Inhaltsplatzhalter 5">
-            <a:extLst>
-              <a:ext uri="{FF2B5EF4-FFF2-40B4-BE49-F238E27FC236}">
-                <a16:creationId xmlns:a16="http://schemas.microsoft.com/office/drawing/2014/main" id="{D7A52B11-902F-47AD-A146-84986C3C5B6F}"/>
-              </a:ext>
-            </a:extLst>
-          </p:cNvPr>
-          <p:cNvSpPr>
-            <a:spLocks noGrp="1"/>
-          </p:cNvSpPr>
+      <p:pic>
+        <p:nvPicPr>
+          <p:cNvPr id="8" name="Inhaltsplatzhalter 7">
+            <a:extLst>
+              <a:ext uri="{FF2B5EF4-FFF2-40B4-BE49-F238E27FC236}">
+                <a16:creationId xmlns:a16="http://schemas.microsoft.com/office/drawing/2014/main" id="{9DA6DC01-27D9-47D5-812D-749C12B202E5}"/>
+              </a:ext>
+            </a:extLst>
+          </p:cNvPr>
+          <p:cNvPicPr>
+            <a:picLocks noGrp="1" noChangeAspect="1"/>
+          </p:cNvPicPr>
           <p:nvPr>
             <p:ph idx="1"/>
           </p:nvPr>
-        </p:nvSpPr>
-        <p:spPr/>
-        <p:txBody>
-          <a:bodyPr/>
-          <a:lstStyle/>
-          <a:p>
-            <a:endParaRPr lang="de-DE"/>
+        </p:nvPicPr>
+        <p:blipFill rotWithShape="1">
+          <a:blip r:embed="rId2">
+            <a:extLst>
+              <a:ext uri="{28A0092B-C50C-407E-A947-70E740481C1C}">
+                <a14:useLocalDpi xmlns:a14="http://schemas.microsoft.com/office/drawing/2010/main" val="0"/>
+              </a:ext>
+            </a:extLst>
+          </a:blip>
+          <a:srcRect l="8841" r="8326"/>
+          <a:stretch/>
+        </p:blipFill>
+        <p:spPr>
+          <a:xfrm>
+            <a:off x="6417939" y="3112189"/>
+            <a:ext cx="5240716" cy="3015199"/>
+          </a:xfrm>
+        </p:spPr>
+      </p:pic>
+      <p:pic>
+        <p:nvPicPr>
+          <p:cNvPr id="10" name="Grafik 9">
+            <a:extLst>
+              <a:ext uri="{FF2B5EF4-FFF2-40B4-BE49-F238E27FC236}">
+                <a16:creationId xmlns:a16="http://schemas.microsoft.com/office/drawing/2014/main" id="{DB0838ED-2F5E-4A82-B080-C6A8B84E6D94}"/>
+              </a:ext>
+            </a:extLst>
+          </p:cNvPr>
+          <p:cNvPicPr>
+            <a:picLocks noChangeAspect="1"/>
+          </p:cNvPicPr>
+          <p:nvPr/>
+        </p:nvPicPr>
+        <p:blipFill rotWithShape="1">
+          <a:blip r:embed="rId3">
+            <a:extLst>
+              <a:ext uri="{28A0092B-C50C-407E-A947-70E740481C1C}">
+                <a14:useLocalDpi xmlns:a14="http://schemas.microsoft.com/office/drawing/2010/main" val="0"/>
+              </a:ext>
+            </a:extLst>
+          </a:blip>
+          <a:srcRect l="8925" r="8029"/>
+          <a:stretch/>
+        </p:blipFill>
+        <p:spPr>
+          <a:xfrm>
+            <a:off x="704088" y="2954151"/>
+            <a:ext cx="5306420" cy="3045205"/>
+          </a:xfrm>
+          <a:prstGeom prst="rect">
+            <a:avLst/>
+          </a:prstGeom>
+        </p:spPr>
+      </p:pic>
+      <p:cxnSp>
+        <p:nvCxnSpPr>
+          <p:cNvPr id="11" name="Gerader Verbinder 10">
+            <a:extLst>
+              <a:ext uri="{FF2B5EF4-FFF2-40B4-BE49-F238E27FC236}">
+                <a16:creationId xmlns:a16="http://schemas.microsoft.com/office/drawing/2014/main" id="{E8C034CC-F036-4B23-9837-C6B0FD5D137E}"/>
+              </a:ext>
+            </a:extLst>
+          </p:cNvPr>
+          <p:cNvCxnSpPr>
+            <a:cxnSpLocks/>
+          </p:cNvCxnSpPr>
+          <p:nvPr/>
+        </p:nvCxnSpPr>
+        <p:spPr>
+          <a:xfrm>
+            <a:off x="1993392" y="3401568"/>
+            <a:ext cx="0" cy="2267712"/>
+          </a:xfrm>
+          <a:prstGeom prst="line">
+            <a:avLst/>
+          </a:prstGeom>
+          <a:ln w="38100">
+            <a:solidFill>
+              <a:schemeClr val="tx1"/>
+            </a:solidFill>
+          </a:ln>
+        </p:spPr>
+        <p:style>
+          <a:lnRef idx="1">
+            <a:schemeClr val="accent1"/>
+          </a:lnRef>
+          <a:fillRef idx="0">
+            <a:schemeClr val="accent1"/>
+          </a:fillRef>
+          <a:effectRef idx="0">
+            <a:schemeClr val="accent1"/>
+          </a:effectRef>
+          <a:fontRef idx="minor">
+            <a:schemeClr val="tx1"/>
+          </a:fontRef>
+        </p:style>
+      </p:cxnSp>
+      <p:cxnSp>
+        <p:nvCxnSpPr>
+          <p:cNvPr id="14" name="Gerader Verbinder 13">
+            <a:extLst>
+              <a:ext uri="{FF2B5EF4-FFF2-40B4-BE49-F238E27FC236}">
+                <a16:creationId xmlns:a16="http://schemas.microsoft.com/office/drawing/2014/main" id="{CE07BC94-15A2-4295-82BD-5952E21F47AE}"/>
+              </a:ext>
+            </a:extLst>
+          </p:cNvPr>
+          <p:cNvCxnSpPr>
+            <a:cxnSpLocks/>
+          </p:cNvCxnSpPr>
+          <p:nvPr/>
+        </p:nvCxnSpPr>
+        <p:spPr>
+          <a:xfrm>
+            <a:off x="2977896" y="3401568"/>
+            <a:ext cx="0" cy="2267712"/>
+          </a:xfrm>
+          <a:prstGeom prst="line">
+            <a:avLst/>
+          </a:prstGeom>
+          <a:ln w="38100">
+            <a:solidFill>
+              <a:schemeClr val="tx1"/>
+            </a:solidFill>
+          </a:ln>
+        </p:spPr>
+        <p:style>
+          <a:lnRef idx="1">
+            <a:schemeClr val="accent1"/>
+          </a:lnRef>
+          <a:fillRef idx="0">
+            <a:schemeClr val="accent1"/>
+          </a:fillRef>
+          <a:effectRef idx="0">
+            <a:schemeClr val="accent1"/>
+          </a:effectRef>
+          <a:fontRef idx="minor">
+            <a:schemeClr val="tx1"/>
+          </a:fontRef>
+        </p:style>
+      </p:cxnSp>
+      <p:cxnSp>
+        <p:nvCxnSpPr>
+          <p:cNvPr id="15" name="Gerader Verbinder 14">
+            <a:extLst>
+              <a:ext uri="{FF2B5EF4-FFF2-40B4-BE49-F238E27FC236}">
+                <a16:creationId xmlns:a16="http://schemas.microsoft.com/office/drawing/2014/main" id="{59C250B0-F76A-4701-987E-12FDB76E6FAA}"/>
+              </a:ext>
+            </a:extLst>
+          </p:cNvPr>
+          <p:cNvCxnSpPr>
+            <a:cxnSpLocks/>
+          </p:cNvCxnSpPr>
+          <p:nvPr/>
+        </p:nvCxnSpPr>
+        <p:spPr>
+          <a:xfrm>
+            <a:off x="7705344" y="3526536"/>
+            <a:ext cx="0" cy="2267712"/>
+          </a:xfrm>
+          <a:prstGeom prst="line">
+            <a:avLst/>
+          </a:prstGeom>
+          <a:ln w="38100">
+            <a:solidFill>
+              <a:schemeClr val="tx1"/>
+            </a:solidFill>
+          </a:ln>
+        </p:spPr>
+        <p:style>
+          <a:lnRef idx="1">
+            <a:schemeClr val="accent1"/>
+          </a:lnRef>
+          <a:fillRef idx="0">
+            <a:schemeClr val="accent1"/>
+          </a:fillRef>
+          <a:effectRef idx="0">
+            <a:schemeClr val="accent1"/>
+          </a:effectRef>
+          <a:fontRef idx="minor">
+            <a:schemeClr val="tx1"/>
+          </a:fontRef>
+        </p:style>
+      </p:cxnSp>
+      <p:cxnSp>
+        <p:nvCxnSpPr>
+          <p:cNvPr id="16" name="Gerader Verbinder 15">
+            <a:extLst>
+              <a:ext uri="{FF2B5EF4-FFF2-40B4-BE49-F238E27FC236}">
+                <a16:creationId xmlns:a16="http://schemas.microsoft.com/office/drawing/2014/main" id="{03A8EB67-0030-4629-8DE2-153DD3D80903}"/>
+              </a:ext>
+            </a:extLst>
+          </p:cNvPr>
+          <p:cNvCxnSpPr>
+            <a:cxnSpLocks/>
+          </p:cNvCxnSpPr>
+          <p:nvPr/>
+        </p:nvCxnSpPr>
+        <p:spPr>
+          <a:xfrm>
+            <a:off x="8680704" y="3526536"/>
+            <a:ext cx="0" cy="2267712"/>
+          </a:xfrm>
+          <a:prstGeom prst="line">
+            <a:avLst/>
+          </a:prstGeom>
+          <a:ln w="38100">
+            <a:solidFill>
+              <a:schemeClr val="tx1"/>
+            </a:solidFill>
+          </a:ln>
+        </p:spPr>
+        <p:style>
+          <a:lnRef idx="1">
+            <a:schemeClr val="accent1"/>
+          </a:lnRef>
+          <a:fillRef idx="0">
+            <a:schemeClr val="accent1"/>
+          </a:fillRef>
+          <a:effectRef idx="0">
+            <a:schemeClr val="accent1"/>
+          </a:effectRef>
+          <a:fontRef idx="minor">
+            <a:schemeClr val="tx1"/>
+          </a:fontRef>
+        </p:style>
+      </p:cxnSp>
+      <p:sp>
+        <p:nvSpPr>
+          <p:cNvPr id="17" name="Textfeld 16">
+            <a:extLst>
+              <a:ext uri="{FF2B5EF4-FFF2-40B4-BE49-F238E27FC236}">
+                <a16:creationId xmlns:a16="http://schemas.microsoft.com/office/drawing/2014/main" id="{2DDE55DE-2A8F-4D9D-80EC-C6BFC43EB062}"/>
+              </a:ext>
+            </a:extLst>
+          </p:cNvPr>
+          <p:cNvSpPr txBox="1"/>
+          <p:nvPr/>
+        </p:nvSpPr>
+        <p:spPr>
+          <a:xfrm>
+            <a:off x="3972593" y="1977458"/>
+            <a:ext cx="4249987" cy="923330"/>
+          </a:xfrm>
+          <a:prstGeom prst="rect">
+            <a:avLst/>
+          </a:prstGeom>
+          <a:noFill/>
+        </p:spPr>
+        <p:txBody>
+          <a:bodyPr wrap="square" rtlCol="0">
+            <a:spAutoFit/>
+          </a:bodyPr>
+          <a:lstStyle/>
+          <a:p>
+            <a:r>
+              <a:rPr lang="de-DE" b="1" dirty="0"/>
+              <a:t>Erkenntnisse:</a:t>
+            </a:r>
+          </a:p>
+          <a:p>
+            <a:pPr marL="285750" indent="-285750">
+              <a:buFont typeface="Arial" panose="020B0604020202020204" pitchFamily="34" charset="0"/>
+              <a:buChar char="•"/>
+            </a:pPr>
+            <a:r>
+              <a:rPr lang="de-DE" dirty="0"/>
+              <a:t>„schnellere“ Konvergenz bei diskreten Funktionen mit Turnierselektion</a:t>
+            </a:r>
           </a:p>
         </p:txBody>
       </p:sp>
@@ -6871,7 +8017,7 @@
         </p:nvSpPr>
         <p:spPr>
           <a:xfrm>
-            <a:off x="1068387" y="1969099"/>
+            <a:off x="1097280" y="286603"/>
             <a:ext cx="10058400" cy="1450757"/>
           </a:xfrm>
         </p:spPr>
@@ -6879,11 +8025,28 @@
           <a:bodyPr/>
           <a:lstStyle/>
           <a:p>
-            <a:pPr algn="ctr"/>
+            <a:r>
+              <a:rPr lang="de-DE" dirty="0">
+                <a:latin typeface="Arial" panose="020B0604020202020204" pitchFamily="34" charset="0"/>
+                <a:cs typeface="Arial" panose="020B0604020202020204" pitchFamily="34" charset="0"/>
+              </a:rPr>
+              <a:t>Testergebnisse - </a:t>
+            </a:r>
             <a:r>
               <a:rPr lang="de-DE" dirty="0"/>
-              <a:t>Vielen Dank für Ihre Aufmerksamkeit !</a:t>
-            </a:r>
+              <a:t>Variieren der Parameter</a:t>
+            </a:r>
+            <a:endParaRPr lang="de-DE" cap="none" dirty="0">
+              <a:solidFill>
+                <a:schemeClr val="tx1">
+                  <a:lumMod val="50000"/>
+                  <a:lumOff val="50000"/>
+                </a:schemeClr>
+              </a:solidFill>
+              <a:effectLst/>
+              <a:latin typeface="Arial" panose="020B0604020202020204" pitchFamily="34" charset="0"/>
+              <a:cs typeface="Arial" panose="020B0604020202020204" pitchFamily="34" charset="0"/>
+            </a:endParaRPr>
           </a:p>
         </p:txBody>
       </p:sp>
@@ -6949,7 +8112,7 @@
           <a:p>
             <a:fld id="{D569A928-58F6-45D5-8F78-96A6F4081ECC}" type="datetime1">
               <a:rPr lang="de-DE" sz="1200" smtClean="0"/>
-              <a:t>17.01.2018</a:t>
+              <a:t>18.01.2018</a:t>
             </a:fld>
             <a:endParaRPr lang="de-DE" dirty="0"/>
           </a:p>
@@ -6985,19 +8148,619 @@
               <a:t>Tuszynski</a:t>
             </a:r>
             <a:endParaRPr lang="de-DE" sz="1400" dirty="0"/>
+          </a:p>
+        </p:txBody>
+      </p:sp>
+      <p:pic>
+        <p:nvPicPr>
+          <p:cNvPr id="12" name="Grafik 11">
+            <a:extLst>
+              <a:ext uri="{FF2B5EF4-FFF2-40B4-BE49-F238E27FC236}">
+                <a16:creationId xmlns:a16="http://schemas.microsoft.com/office/drawing/2014/main" id="{5BC5394C-A61E-4A2D-B827-CCFE2BDE089D}"/>
+              </a:ext>
+            </a:extLst>
+          </p:cNvPr>
+          <p:cNvPicPr>
+            <a:picLocks noChangeAspect="1"/>
+          </p:cNvPicPr>
+          <p:nvPr/>
+        </p:nvPicPr>
+        <p:blipFill rotWithShape="1">
+          <a:blip r:embed="rId2">
+            <a:extLst>
+              <a:ext uri="{28A0092B-C50C-407E-A947-70E740481C1C}">
+                <a14:useLocalDpi xmlns:a14="http://schemas.microsoft.com/office/drawing/2010/main" val="0"/>
+              </a:ext>
+            </a:extLst>
+          </a:blip>
+          <a:srcRect l="9000" r="8500" b="3417"/>
+          <a:stretch/>
+        </p:blipFill>
+        <p:spPr>
+          <a:xfrm>
+            <a:off x="906409" y="2709222"/>
+            <a:ext cx="4900031" cy="2733843"/>
+          </a:xfrm>
+          <a:prstGeom prst="rect">
+            <a:avLst/>
+          </a:prstGeom>
+        </p:spPr>
+      </p:pic>
+      <p:sp>
+        <p:nvSpPr>
+          <p:cNvPr id="19" name="Ellipse 18">
+            <a:extLst>
+              <a:ext uri="{FF2B5EF4-FFF2-40B4-BE49-F238E27FC236}">
+                <a16:creationId xmlns:a16="http://schemas.microsoft.com/office/drawing/2014/main" id="{EA609E31-1012-494B-AEDF-96D3124F3436}"/>
+              </a:ext>
+            </a:extLst>
+          </p:cNvPr>
+          <p:cNvSpPr/>
+          <p:nvPr/>
+        </p:nvSpPr>
+        <p:spPr>
+          <a:xfrm rot="16200000">
+            <a:off x="2494792" y="3573779"/>
+            <a:ext cx="755905" cy="283465"/>
+          </a:xfrm>
+          <a:prstGeom prst="ellipse">
+            <a:avLst/>
+          </a:prstGeom>
+          <a:noFill/>
+          <a:ln>
+            <a:solidFill>
+              <a:srgbClr val="FF0000"/>
+            </a:solidFill>
+          </a:ln>
+        </p:spPr>
+        <p:style>
+          <a:lnRef idx="2">
+            <a:schemeClr val="accent1">
+              <a:shade val="50000"/>
+            </a:schemeClr>
+          </a:lnRef>
+          <a:fillRef idx="1">
+            <a:schemeClr val="accent1"/>
+          </a:fillRef>
+          <a:effectRef idx="0">
+            <a:schemeClr val="accent1"/>
+          </a:effectRef>
+          <a:fontRef idx="minor">
+            <a:schemeClr val="lt1"/>
+          </a:fontRef>
+        </p:style>
+        <p:txBody>
+          <a:bodyPr rtlCol="0" anchor="ctr"/>
+          <a:lstStyle/>
+          <a:p>
+            <a:pPr algn="ctr"/>
+            <a:endParaRPr lang="de-DE"/>
+          </a:p>
+        </p:txBody>
+      </p:sp>
+      <p:sp>
+        <p:nvSpPr>
+          <p:cNvPr id="20" name="Ellipse 19">
+            <a:extLst>
+              <a:ext uri="{FF2B5EF4-FFF2-40B4-BE49-F238E27FC236}">
+                <a16:creationId xmlns:a16="http://schemas.microsoft.com/office/drawing/2014/main" id="{81618E35-86C4-4FEB-B969-0EAD62BD4573}"/>
+              </a:ext>
+            </a:extLst>
+          </p:cNvPr>
+          <p:cNvSpPr/>
+          <p:nvPr/>
+        </p:nvSpPr>
+        <p:spPr>
+          <a:xfrm rot="16200000">
+            <a:off x="1476760" y="3589019"/>
+            <a:ext cx="755905" cy="283465"/>
+          </a:xfrm>
+          <a:prstGeom prst="ellipse">
+            <a:avLst/>
+          </a:prstGeom>
+          <a:noFill/>
+          <a:ln>
+            <a:solidFill>
+              <a:srgbClr val="FF0000"/>
+            </a:solidFill>
+          </a:ln>
+        </p:spPr>
+        <p:style>
+          <a:lnRef idx="2">
+            <a:schemeClr val="accent1">
+              <a:shade val="50000"/>
+            </a:schemeClr>
+          </a:lnRef>
+          <a:fillRef idx="1">
+            <a:schemeClr val="accent1"/>
+          </a:fillRef>
+          <a:effectRef idx="0">
+            <a:schemeClr val="accent1"/>
+          </a:effectRef>
+          <a:fontRef idx="minor">
+            <a:schemeClr val="lt1"/>
+          </a:fontRef>
+        </p:style>
+        <p:txBody>
+          <a:bodyPr rtlCol="0" anchor="ctr"/>
+          <a:lstStyle/>
+          <a:p>
+            <a:pPr algn="ctr"/>
+            <a:endParaRPr lang="de-DE"/>
+          </a:p>
+        </p:txBody>
+      </p:sp>
+      <p:sp>
+        <p:nvSpPr>
+          <p:cNvPr id="21" name="Ellipse 20">
+            <a:extLst>
+              <a:ext uri="{FF2B5EF4-FFF2-40B4-BE49-F238E27FC236}">
+                <a16:creationId xmlns:a16="http://schemas.microsoft.com/office/drawing/2014/main" id="{CE5FFC8E-50CC-47F1-BEB0-CAD9D3F802EA}"/>
+              </a:ext>
+            </a:extLst>
+          </p:cNvPr>
+          <p:cNvSpPr/>
+          <p:nvPr/>
+        </p:nvSpPr>
+        <p:spPr>
+          <a:xfrm rot="16200000">
+            <a:off x="3521968" y="3576827"/>
+            <a:ext cx="755905" cy="283465"/>
+          </a:xfrm>
+          <a:prstGeom prst="ellipse">
+            <a:avLst/>
+          </a:prstGeom>
+          <a:noFill/>
+          <a:ln>
+            <a:solidFill>
+              <a:srgbClr val="FF0000"/>
+            </a:solidFill>
+          </a:ln>
+        </p:spPr>
+        <p:style>
+          <a:lnRef idx="2">
+            <a:schemeClr val="accent1">
+              <a:shade val="50000"/>
+            </a:schemeClr>
+          </a:lnRef>
+          <a:fillRef idx="1">
+            <a:schemeClr val="accent1"/>
+          </a:fillRef>
+          <a:effectRef idx="0">
+            <a:schemeClr val="accent1"/>
+          </a:effectRef>
+          <a:fontRef idx="minor">
+            <a:schemeClr val="lt1"/>
+          </a:fontRef>
+        </p:style>
+        <p:txBody>
+          <a:bodyPr rtlCol="0" anchor="ctr"/>
+          <a:lstStyle/>
+          <a:p>
+            <a:pPr algn="ctr"/>
+            <a:endParaRPr lang="de-DE"/>
+          </a:p>
+        </p:txBody>
+      </p:sp>
+      <p:pic>
+        <p:nvPicPr>
+          <p:cNvPr id="22" name="Grafik 21">
+            <a:extLst>
+              <a:ext uri="{FF2B5EF4-FFF2-40B4-BE49-F238E27FC236}">
+                <a16:creationId xmlns:a16="http://schemas.microsoft.com/office/drawing/2014/main" id="{02ADC199-61B3-4FA2-A639-7F25500F8A57}"/>
+              </a:ext>
+            </a:extLst>
+          </p:cNvPr>
+          <p:cNvPicPr>
+            <a:picLocks noChangeAspect="1"/>
+          </p:cNvPicPr>
+          <p:nvPr/>
+        </p:nvPicPr>
+        <p:blipFill rotWithShape="1">
+          <a:blip r:embed="rId3">
+            <a:extLst>
+              <a:ext uri="{28A0092B-C50C-407E-A947-70E740481C1C}">
+                <a14:useLocalDpi xmlns:a14="http://schemas.microsoft.com/office/drawing/2010/main" val="0"/>
+              </a:ext>
+            </a:extLst>
+          </a:blip>
+          <a:srcRect l="9000" r="8500" b="3103"/>
+          <a:stretch/>
+        </p:blipFill>
+        <p:spPr>
+          <a:xfrm>
+            <a:off x="6284538" y="2839623"/>
+            <a:ext cx="4651149" cy="2603442"/>
+          </a:xfrm>
+          <a:prstGeom prst="rect">
+            <a:avLst/>
+          </a:prstGeom>
+        </p:spPr>
+      </p:pic>
+      <p:sp>
+        <p:nvSpPr>
+          <p:cNvPr id="23" name="Ellipse 22">
+            <a:extLst>
+              <a:ext uri="{FF2B5EF4-FFF2-40B4-BE49-F238E27FC236}">
+                <a16:creationId xmlns:a16="http://schemas.microsoft.com/office/drawing/2014/main" id="{105E6017-9399-4611-9EF2-D9EA877971AF}"/>
+              </a:ext>
+            </a:extLst>
+          </p:cNvPr>
+          <p:cNvSpPr/>
+          <p:nvPr/>
+        </p:nvSpPr>
+        <p:spPr>
+          <a:xfrm rot="16200000">
+            <a:off x="7111358" y="3621659"/>
+            <a:ext cx="755905" cy="283465"/>
+          </a:xfrm>
+          <a:prstGeom prst="ellipse">
+            <a:avLst/>
+          </a:prstGeom>
+          <a:noFill/>
+          <a:ln>
+            <a:solidFill>
+              <a:srgbClr val="FF0000"/>
+            </a:solidFill>
+          </a:ln>
+        </p:spPr>
+        <p:style>
+          <a:lnRef idx="2">
+            <a:schemeClr val="accent1">
+              <a:shade val="50000"/>
+            </a:schemeClr>
+          </a:lnRef>
+          <a:fillRef idx="1">
+            <a:schemeClr val="accent1"/>
+          </a:fillRef>
+          <a:effectRef idx="0">
+            <a:schemeClr val="accent1"/>
+          </a:effectRef>
+          <a:fontRef idx="minor">
+            <a:schemeClr val="lt1"/>
+          </a:fontRef>
+        </p:style>
+        <p:txBody>
+          <a:bodyPr rtlCol="0" anchor="ctr"/>
+          <a:lstStyle/>
+          <a:p>
+            <a:pPr algn="ctr"/>
+            <a:endParaRPr lang="de-DE"/>
+          </a:p>
+        </p:txBody>
+      </p:sp>
+      <p:sp>
+        <p:nvSpPr>
+          <p:cNvPr id="24" name="Ellipse 23">
+            <a:extLst>
+              <a:ext uri="{FF2B5EF4-FFF2-40B4-BE49-F238E27FC236}">
+                <a16:creationId xmlns:a16="http://schemas.microsoft.com/office/drawing/2014/main" id="{D6BABB0D-C99E-4434-8980-421E5B405187}"/>
+              </a:ext>
+            </a:extLst>
+          </p:cNvPr>
+          <p:cNvSpPr/>
+          <p:nvPr/>
+        </p:nvSpPr>
+        <p:spPr>
+          <a:xfrm rot="16200000">
+            <a:off x="8101031" y="3621659"/>
+            <a:ext cx="755905" cy="283465"/>
+          </a:xfrm>
+          <a:prstGeom prst="ellipse">
+            <a:avLst/>
+          </a:prstGeom>
+          <a:noFill/>
+          <a:ln>
+            <a:solidFill>
+              <a:srgbClr val="FF0000"/>
+            </a:solidFill>
+          </a:ln>
+        </p:spPr>
+        <p:style>
+          <a:lnRef idx="2">
+            <a:schemeClr val="accent1">
+              <a:shade val="50000"/>
+            </a:schemeClr>
+          </a:lnRef>
+          <a:fillRef idx="1">
+            <a:schemeClr val="accent1"/>
+          </a:fillRef>
+          <a:effectRef idx="0">
+            <a:schemeClr val="accent1"/>
+          </a:effectRef>
+          <a:fontRef idx="minor">
+            <a:schemeClr val="lt1"/>
+          </a:fontRef>
+        </p:style>
+        <p:txBody>
+          <a:bodyPr rtlCol="0" anchor="ctr"/>
+          <a:lstStyle/>
+          <a:p>
+            <a:pPr algn="ctr"/>
+            <a:endParaRPr lang="de-DE"/>
+          </a:p>
+        </p:txBody>
+      </p:sp>
+      <p:sp>
+        <p:nvSpPr>
+          <p:cNvPr id="25" name="Ellipse 24">
+            <a:extLst>
+              <a:ext uri="{FF2B5EF4-FFF2-40B4-BE49-F238E27FC236}">
+                <a16:creationId xmlns:a16="http://schemas.microsoft.com/office/drawing/2014/main" id="{CC909DEE-4D2D-4BCB-A13D-EF560D8D7DA8}"/>
+              </a:ext>
+            </a:extLst>
+          </p:cNvPr>
+          <p:cNvSpPr/>
+          <p:nvPr/>
+        </p:nvSpPr>
+        <p:spPr>
+          <a:xfrm rot="16200000">
+            <a:off x="9072376" y="3613403"/>
+            <a:ext cx="755905" cy="283465"/>
+          </a:xfrm>
+          <a:prstGeom prst="ellipse">
+            <a:avLst/>
+          </a:prstGeom>
+          <a:noFill/>
+          <a:ln>
+            <a:solidFill>
+              <a:srgbClr val="FF0000"/>
+            </a:solidFill>
+          </a:ln>
+        </p:spPr>
+        <p:style>
+          <a:lnRef idx="2">
+            <a:schemeClr val="accent1">
+              <a:shade val="50000"/>
+            </a:schemeClr>
+          </a:lnRef>
+          <a:fillRef idx="1">
+            <a:schemeClr val="accent1"/>
+          </a:fillRef>
+          <a:effectRef idx="0">
+            <a:schemeClr val="accent1"/>
+          </a:effectRef>
+          <a:fontRef idx="minor">
+            <a:schemeClr val="lt1"/>
+          </a:fontRef>
+        </p:style>
+        <p:txBody>
+          <a:bodyPr rtlCol="0" anchor="ctr"/>
+          <a:lstStyle/>
+          <a:p>
+            <a:pPr algn="ctr"/>
+            <a:endParaRPr lang="de-DE"/>
           </a:p>
         </p:txBody>
       </p:sp>
     </p:spTree>
     <p:extLst>
       <p:ext uri="{BB962C8B-B14F-4D97-AF65-F5344CB8AC3E}">
-        <p14:creationId xmlns:p14="http://schemas.microsoft.com/office/powerpoint/2010/main" val="1264970260"/>
+        <p14:creationId xmlns:p14="http://schemas.microsoft.com/office/powerpoint/2010/main" val="551358265"/>
       </p:ext>
     </p:extLst>
   </p:cSld>
   <p:clrMapOvr>
     <a:masterClrMapping/>
   </p:clrMapOvr>
+  <p:timing>
+    <p:tnLst>
+      <p:par>
+        <p:cTn id="1" dur="indefinite" restart="never" nodeType="tmRoot">
+          <p:childTnLst>
+            <p:seq concurrent="1" nextAc="seek">
+              <p:cTn id="2" dur="indefinite" nodeType="mainSeq">
+                <p:childTnLst>
+                  <p:par>
+                    <p:cTn id="3" fill="hold">
+                      <p:stCondLst>
+                        <p:cond delay="indefinite"/>
+                      </p:stCondLst>
+                      <p:childTnLst>
+                        <p:par>
+                          <p:cTn id="4" fill="hold">
+                            <p:stCondLst>
+                              <p:cond delay="0"/>
+                            </p:stCondLst>
+                            <p:childTnLst>
+                              <p:par>
+                                <p:cTn id="5" presetID="1" presetClass="entr" presetSubtype="0" fill="hold" grpId="0" nodeType="clickEffect">
+                                  <p:stCondLst>
+                                    <p:cond delay="0"/>
+                                  </p:stCondLst>
+                                  <p:childTnLst>
+                                    <p:set>
+                                      <p:cBhvr>
+                                        <p:cTn id="6" dur="1" fill="hold">
+                                          <p:stCondLst>
+                                            <p:cond delay="0"/>
+                                          </p:stCondLst>
+                                        </p:cTn>
+                                        <p:tgtEl>
+                                          <p:spTgt spid="19"/>
+                                        </p:tgtEl>
+                                        <p:attrNameLst>
+                                          <p:attrName>style.visibility</p:attrName>
+                                        </p:attrNameLst>
+                                      </p:cBhvr>
+                                      <p:to>
+                                        <p:strVal val="visible"/>
+                                      </p:to>
+                                    </p:set>
+                                  </p:childTnLst>
+                                </p:cTn>
+                              </p:par>
+                              <p:par>
+                                <p:cTn id="7" presetID="1" presetClass="entr" presetSubtype="0" fill="hold" grpId="0" nodeType="withEffect">
+                                  <p:stCondLst>
+                                    <p:cond delay="0"/>
+                                  </p:stCondLst>
+                                  <p:childTnLst>
+                                    <p:set>
+                                      <p:cBhvr>
+                                        <p:cTn id="8" dur="1" fill="hold">
+                                          <p:stCondLst>
+                                            <p:cond delay="0"/>
+                                          </p:stCondLst>
+                                        </p:cTn>
+                                        <p:tgtEl>
+                                          <p:spTgt spid="20"/>
+                                        </p:tgtEl>
+                                        <p:attrNameLst>
+                                          <p:attrName>style.visibility</p:attrName>
+                                        </p:attrNameLst>
+                                      </p:cBhvr>
+                                      <p:to>
+                                        <p:strVal val="visible"/>
+                                      </p:to>
+                                    </p:set>
+                                  </p:childTnLst>
+                                </p:cTn>
+                              </p:par>
+                              <p:par>
+                                <p:cTn id="9" presetID="1" presetClass="entr" presetSubtype="0" fill="hold" grpId="0" nodeType="withEffect">
+                                  <p:stCondLst>
+                                    <p:cond delay="0"/>
+                                  </p:stCondLst>
+                                  <p:childTnLst>
+                                    <p:set>
+                                      <p:cBhvr>
+                                        <p:cTn id="10" dur="1" fill="hold">
+                                          <p:stCondLst>
+                                            <p:cond delay="0"/>
+                                          </p:stCondLst>
+                                        </p:cTn>
+                                        <p:tgtEl>
+                                          <p:spTgt spid="21"/>
+                                        </p:tgtEl>
+                                        <p:attrNameLst>
+                                          <p:attrName>style.visibility</p:attrName>
+                                        </p:attrNameLst>
+                                      </p:cBhvr>
+                                      <p:to>
+                                        <p:strVal val="visible"/>
+                                      </p:to>
+                                    </p:set>
+                                  </p:childTnLst>
+                                </p:cTn>
+                              </p:par>
+                              <p:par>
+                                <p:cTn id="11" presetID="1" presetClass="entr" presetSubtype="0" fill="hold" grpId="0" nodeType="withEffect">
+                                  <p:stCondLst>
+                                    <p:cond delay="0"/>
+                                  </p:stCondLst>
+                                  <p:childTnLst>
+                                    <p:set>
+                                      <p:cBhvr>
+                                        <p:cTn id="12" dur="1" fill="hold">
+                                          <p:stCondLst>
+                                            <p:cond delay="0"/>
+                                          </p:stCondLst>
+                                        </p:cTn>
+                                        <p:tgtEl>
+                                          <p:spTgt spid="23"/>
+                                        </p:tgtEl>
+                                        <p:attrNameLst>
+                                          <p:attrName>style.visibility</p:attrName>
+                                        </p:attrNameLst>
+                                      </p:cBhvr>
+                                      <p:to>
+                                        <p:strVal val="visible"/>
+                                      </p:to>
+                                    </p:set>
+                                  </p:childTnLst>
+                                </p:cTn>
+                              </p:par>
+                              <p:par>
+                                <p:cTn id="13" presetID="1" presetClass="entr" presetSubtype="0" fill="hold" grpId="0" nodeType="withEffect">
+                                  <p:stCondLst>
+                                    <p:cond delay="0"/>
+                                  </p:stCondLst>
+                                  <p:childTnLst>
+                                    <p:set>
+                                      <p:cBhvr>
+                                        <p:cTn id="14" dur="1" fill="hold">
+                                          <p:stCondLst>
+                                            <p:cond delay="0"/>
+                                          </p:stCondLst>
+                                        </p:cTn>
+                                        <p:tgtEl>
+                                          <p:spTgt spid="24"/>
+                                        </p:tgtEl>
+                                        <p:attrNameLst>
+                                          <p:attrName>style.visibility</p:attrName>
+                                        </p:attrNameLst>
+                                      </p:cBhvr>
+                                      <p:to>
+                                        <p:strVal val="visible"/>
+                                      </p:to>
+                                    </p:set>
+                                  </p:childTnLst>
+                                </p:cTn>
+                              </p:par>
+                              <p:par>
+                                <p:cTn id="15" presetID="1" presetClass="entr" presetSubtype="0" fill="hold" grpId="0" nodeType="withEffect">
+                                  <p:stCondLst>
+                                    <p:cond delay="0"/>
+                                  </p:stCondLst>
+                                  <p:childTnLst>
+                                    <p:set>
+                                      <p:cBhvr>
+                                        <p:cTn id="16" dur="1" fill="hold">
+                                          <p:stCondLst>
+                                            <p:cond delay="0"/>
+                                          </p:stCondLst>
+                                        </p:cTn>
+                                        <p:tgtEl>
+                                          <p:spTgt spid="25"/>
+                                        </p:tgtEl>
+                                        <p:attrNameLst>
+                                          <p:attrName>style.visibility</p:attrName>
+                                        </p:attrNameLst>
+                                      </p:cBhvr>
+                                      <p:to>
+                                        <p:strVal val="visible"/>
+                                      </p:to>
+                                    </p:set>
+                                  </p:childTnLst>
+                                </p:cTn>
+                              </p:par>
+                            </p:childTnLst>
+                          </p:cTn>
+                        </p:par>
+                      </p:childTnLst>
+                    </p:cTn>
+                  </p:par>
+                </p:childTnLst>
+              </p:cTn>
+              <p:prevCondLst>
+                <p:cond evt="onPrev" delay="0">
+                  <p:tgtEl>
+                    <p:sldTgt/>
+                  </p:tgtEl>
+                </p:cond>
+              </p:prevCondLst>
+              <p:nextCondLst>
+                <p:cond evt="onNext" delay="0">
+                  <p:tgtEl>
+                    <p:sldTgt/>
+                  </p:tgtEl>
+                </p:cond>
+              </p:nextCondLst>
+            </p:seq>
+          </p:childTnLst>
+        </p:cTn>
+      </p:par>
+    </p:tnLst>
+    <p:bldLst>
+      <p:bldP spid="19" grpId="0" animBg="1"/>
+      <p:bldP spid="20" grpId="0" animBg="1"/>
+      <p:bldP spid="21" grpId="0" animBg="1"/>
+      <p:bldP spid="23" grpId="0" animBg="1"/>
+      <p:bldP spid="24" grpId="0" animBg="1"/>
+      <p:bldP spid="25" grpId="0" animBg="1"/>
+    </p:bldLst>
+  </p:timing>
 </p:sld>
 </file>
 
@@ -7145,6 +8908,16 @@
               <a:buFont typeface="+mj-lt"/>
               <a:buAutoNum type="arabicPeriod"/>
             </a:pPr>
+            <a:r>
+              <a:rPr lang="de-DE" dirty="0"/>
+              <a:t>Fazit</a:t>
+            </a:r>
+          </a:p>
+          <a:p>
+            <a:pPr marL="457200" indent="-457200">
+              <a:buFont typeface="+mj-lt"/>
+              <a:buAutoNum type="arabicPeriod"/>
+            </a:pPr>
             <a:endParaRPr lang="de-DE" dirty="0"/>
           </a:p>
         </p:txBody>
@@ -7211,7 +8984,7 @@
           <a:p>
             <a:fld id="{D569A928-58F6-45D5-8F78-96A6F4081ECC}" type="datetime1">
               <a:rPr lang="de-DE" sz="1200" smtClean="0"/>
-              <a:t>17.01.2018</a:t>
+              <a:t>18.01.2018</a:t>
             </a:fld>
             <a:endParaRPr lang="de-DE" dirty="0"/>
           </a:p>
@@ -7254,6 +9027,374 @@
     <p:extLst>
       <p:ext uri="{BB962C8B-B14F-4D97-AF65-F5344CB8AC3E}">
         <p14:creationId xmlns:p14="http://schemas.microsoft.com/office/powerpoint/2010/main" val="4066799181"/>
+      </p:ext>
+    </p:extLst>
+  </p:cSld>
+  <p:clrMapOvr>
+    <a:masterClrMapping/>
+  </p:clrMapOvr>
+</p:sld>
+</file>
+
+<file path=ppt/slides/slide20.xml><?xml version="1.0" encoding="utf-8"?>
+<p:sld xmlns:a="http://schemas.openxmlformats.org/drawingml/2006/main" xmlns:r="http://schemas.openxmlformats.org/officeDocument/2006/relationships" xmlns:p="http://schemas.openxmlformats.org/presentationml/2006/main">
+  <p:cSld>
+    <p:spTree>
+      <p:nvGrpSpPr>
+        <p:cNvPr id="1" name=""/>
+        <p:cNvGrpSpPr/>
+        <p:nvPr/>
+      </p:nvGrpSpPr>
+      <p:grpSpPr>
+        <a:xfrm>
+          <a:off x="0" y="0"/>
+          <a:ext cx="0" cy="0"/>
+          <a:chOff x="0" y="0"/>
+          <a:chExt cx="0" cy="0"/>
+        </a:xfrm>
+      </p:grpSpPr>
+      <p:sp>
+        <p:nvSpPr>
+          <p:cNvPr id="2" name="Titel 1">
+            <a:extLst>
+              <a:ext uri="{FF2B5EF4-FFF2-40B4-BE49-F238E27FC236}">
+                <a16:creationId xmlns:a16="http://schemas.microsoft.com/office/drawing/2014/main" id="{9D9A6E8E-1D72-4DFE-962D-45AB57008C9F}"/>
+              </a:ext>
+            </a:extLst>
+          </p:cNvPr>
+          <p:cNvSpPr>
+            <a:spLocks noGrp="1"/>
+          </p:cNvSpPr>
+          <p:nvPr>
+            <p:ph type="title"/>
+          </p:nvPr>
+        </p:nvSpPr>
+        <p:spPr>
+          <a:xfrm>
+            <a:off x="1097280" y="286603"/>
+            <a:ext cx="10058400" cy="1450757"/>
+          </a:xfrm>
+        </p:spPr>
+        <p:txBody>
+          <a:bodyPr/>
+          <a:lstStyle/>
+          <a:p>
+            <a:r>
+              <a:rPr lang="de-DE" dirty="0">
+                <a:latin typeface="Arial" panose="020B0604020202020204" pitchFamily="34" charset="0"/>
+                <a:cs typeface="Arial" panose="020B0604020202020204" pitchFamily="34" charset="0"/>
+              </a:rPr>
+              <a:t>Fazit/Zusammenfassung</a:t>
+            </a:r>
+            <a:endParaRPr lang="de-DE" cap="none" dirty="0">
+              <a:solidFill>
+                <a:schemeClr val="tx1">
+                  <a:lumMod val="50000"/>
+                  <a:lumOff val="50000"/>
+                </a:schemeClr>
+              </a:solidFill>
+              <a:effectLst/>
+              <a:latin typeface="Arial" panose="020B0604020202020204" pitchFamily="34" charset="0"/>
+              <a:cs typeface="Arial" panose="020B0604020202020204" pitchFamily="34" charset="0"/>
+            </a:endParaRPr>
+          </a:p>
+        </p:txBody>
+      </p:sp>
+      <p:sp>
+        <p:nvSpPr>
+          <p:cNvPr id="4" name="Foliennummernplatzhalter 3">
+            <a:extLst>
+              <a:ext uri="{FF2B5EF4-FFF2-40B4-BE49-F238E27FC236}">
+                <a16:creationId xmlns:a16="http://schemas.microsoft.com/office/drawing/2014/main" id="{EB22FCC9-4D73-4159-B633-DF057E3F757A}"/>
+              </a:ext>
+            </a:extLst>
+          </p:cNvPr>
+          <p:cNvSpPr>
+            <a:spLocks noGrp="1"/>
+          </p:cNvSpPr>
+          <p:nvPr>
+            <p:ph type="sldNum" sz="quarter" idx="12"/>
+          </p:nvPr>
+        </p:nvSpPr>
+        <p:spPr>
+          <a:xfrm>
+            <a:off x="11420911" y="6459785"/>
+            <a:ext cx="771089" cy="365125"/>
+          </a:xfrm>
+        </p:spPr>
+        <p:txBody>
+          <a:bodyPr/>
+          <a:lstStyle/>
+          <a:p>
+            <a:fld id="{CD38BFD1-898B-4ABD-A7E4-9AD96C214709}" type="slidenum">
+              <a:rPr lang="de-DE" sz="2400" smtClean="0"/>
+              <a:t>20</a:t>
+            </a:fld>
+            <a:endParaRPr lang="de-DE" sz="1600" dirty="0"/>
+          </a:p>
+        </p:txBody>
+      </p:sp>
+      <p:sp>
+        <p:nvSpPr>
+          <p:cNvPr id="5" name="Datumsplatzhalter 4">
+            <a:extLst>
+              <a:ext uri="{FF2B5EF4-FFF2-40B4-BE49-F238E27FC236}">
+                <a16:creationId xmlns:a16="http://schemas.microsoft.com/office/drawing/2014/main" id="{5CADFF1D-BC25-4BF7-9877-2CC77BD54469}"/>
+              </a:ext>
+            </a:extLst>
+          </p:cNvPr>
+          <p:cNvSpPr>
+            <a:spLocks noGrp="1"/>
+          </p:cNvSpPr>
+          <p:nvPr>
+            <p:ph type="dt" sz="half" idx="10"/>
+          </p:nvPr>
+        </p:nvSpPr>
+        <p:spPr>
+          <a:xfrm>
+            <a:off x="0" y="6473050"/>
+            <a:ext cx="2472271" cy="365125"/>
+          </a:xfrm>
+        </p:spPr>
+        <p:txBody>
+          <a:bodyPr/>
+          <a:lstStyle/>
+          <a:p>
+            <a:fld id="{D569A928-58F6-45D5-8F78-96A6F4081ECC}" type="datetime1">
+              <a:rPr lang="de-DE" sz="1200" smtClean="0"/>
+              <a:t>18.01.2018</a:t>
+            </a:fld>
+            <a:endParaRPr lang="de-DE" dirty="0"/>
+          </a:p>
+        </p:txBody>
+      </p:sp>
+      <p:sp>
+        <p:nvSpPr>
+          <p:cNvPr id="7" name="Fußzeilenplatzhalter 6">
+            <a:extLst>
+              <a:ext uri="{FF2B5EF4-FFF2-40B4-BE49-F238E27FC236}">
+                <a16:creationId xmlns:a16="http://schemas.microsoft.com/office/drawing/2014/main" id="{85A3A0C2-EAE0-4572-87C1-BF70B0815FA9}"/>
+              </a:ext>
+            </a:extLst>
+          </p:cNvPr>
+          <p:cNvSpPr>
+            <a:spLocks noGrp="1"/>
+          </p:cNvSpPr>
+          <p:nvPr>
+            <p:ph type="ftr" sz="quarter" idx="11"/>
+          </p:nvPr>
+        </p:nvSpPr>
+        <p:spPr/>
+        <p:txBody>
+          <a:bodyPr/>
+          <a:lstStyle/>
+          <a:p>
+            <a:r>
+              <a:rPr lang="de-DE" sz="1400" dirty="0"/>
+              <a:t>Johann Schröder, Kevin Penner, Michael </a:t>
+            </a:r>
+            <a:r>
+              <a:rPr lang="de-DE" sz="1400" dirty="0" err="1"/>
+              <a:t>Tuszynski</a:t>
+            </a:r>
+            <a:endParaRPr lang="de-DE" sz="1400" dirty="0"/>
+          </a:p>
+        </p:txBody>
+      </p:sp>
+      <p:sp>
+        <p:nvSpPr>
+          <p:cNvPr id="6" name="Inhaltsplatzhalter 5">
+            <a:extLst>
+              <a:ext uri="{FF2B5EF4-FFF2-40B4-BE49-F238E27FC236}">
+                <a16:creationId xmlns:a16="http://schemas.microsoft.com/office/drawing/2014/main" id="{62D9F4BD-335F-4827-A8F3-F4C780EC25B4}"/>
+              </a:ext>
+            </a:extLst>
+          </p:cNvPr>
+          <p:cNvSpPr>
+            <a:spLocks noGrp="1"/>
+          </p:cNvSpPr>
+          <p:nvPr>
+            <p:ph idx="1"/>
+          </p:nvPr>
+        </p:nvSpPr>
+        <p:spPr/>
+        <p:txBody>
+          <a:bodyPr/>
+          <a:lstStyle/>
+          <a:p>
+            <a:endParaRPr lang="de-DE" dirty="0"/>
+          </a:p>
+        </p:txBody>
+      </p:sp>
+    </p:spTree>
+    <p:extLst>
+      <p:ext uri="{BB962C8B-B14F-4D97-AF65-F5344CB8AC3E}">
+        <p14:creationId xmlns:p14="http://schemas.microsoft.com/office/powerpoint/2010/main" val="3721425199"/>
+      </p:ext>
+    </p:extLst>
+  </p:cSld>
+  <p:clrMapOvr>
+    <a:masterClrMapping/>
+  </p:clrMapOvr>
+</p:sld>
+</file>
+
+<file path=ppt/slides/slide21.xml><?xml version="1.0" encoding="utf-8"?>
+<p:sld xmlns:a="http://schemas.openxmlformats.org/drawingml/2006/main" xmlns:r="http://schemas.openxmlformats.org/officeDocument/2006/relationships" xmlns:p="http://schemas.openxmlformats.org/presentationml/2006/main">
+  <p:cSld>
+    <p:spTree>
+      <p:nvGrpSpPr>
+        <p:cNvPr id="1" name=""/>
+        <p:cNvGrpSpPr/>
+        <p:nvPr/>
+      </p:nvGrpSpPr>
+      <p:grpSpPr>
+        <a:xfrm>
+          <a:off x="0" y="0"/>
+          <a:ext cx="0" cy="0"/>
+          <a:chOff x="0" y="0"/>
+          <a:chExt cx="0" cy="0"/>
+        </a:xfrm>
+      </p:grpSpPr>
+      <p:sp>
+        <p:nvSpPr>
+          <p:cNvPr id="2" name="Titel 1">
+            <a:extLst>
+              <a:ext uri="{FF2B5EF4-FFF2-40B4-BE49-F238E27FC236}">
+                <a16:creationId xmlns:a16="http://schemas.microsoft.com/office/drawing/2014/main" id="{9D9A6E8E-1D72-4DFE-962D-45AB57008C9F}"/>
+              </a:ext>
+            </a:extLst>
+          </p:cNvPr>
+          <p:cNvSpPr>
+            <a:spLocks noGrp="1"/>
+          </p:cNvSpPr>
+          <p:nvPr>
+            <p:ph type="title"/>
+          </p:nvPr>
+        </p:nvSpPr>
+        <p:spPr>
+          <a:xfrm>
+            <a:off x="1068387" y="1969099"/>
+            <a:ext cx="10058400" cy="1450757"/>
+          </a:xfrm>
+        </p:spPr>
+        <p:txBody>
+          <a:bodyPr/>
+          <a:lstStyle/>
+          <a:p>
+            <a:pPr algn="ctr"/>
+            <a:r>
+              <a:rPr lang="de-DE" dirty="0"/>
+              <a:t>Vielen Dank für Ihre Aufmerksamkeit !</a:t>
+            </a:r>
+          </a:p>
+        </p:txBody>
+      </p:sp>
+      <p:sp>
+        <p:nvSpPr>
+          <p:cNvPr id="4" name="Foliennummernplatzhalter 3">
+            <a:extLst>
+              <a:ext uri="{FF2B5EF4-FFF2-40B4-BE49-F238E27FC236}">
+                <a16:creationId xmlns:a16="http://schemas.microsoft.com/office/drawing/2014/main" id="{EB22FCC9-4D73-4159-B633-DF057E3F757A}"/>
+              </a:ext>
+            </a:extLst>
+          </p:cNvPr>
+          <p:cNvSpPr>
+            <a:spLocks noGrp="1"/>
+          </p:cNvSpPr>
+          <p:nvPr>
+            <p:ph type="sldNum" sz="quarter" idx="12"/>
+          </p:nvPr>
+        </p:nvSpPr>
+        <p:spPr>
+          <a:xfrm>
+            <a:off x="11420911" y="6459785"/>
+            <a:ext cx="771089" cy="365125"/>
+          </a:xfrm>
+        </p:spPr>
+        <p:txBody>
+          <a:bodyPr/>
+          <a:lstStyle/>
+          <a:p>
+            <a:fld id="{CD38BFD1-898B-4ABD-A7E4-9AD96C214709}" type="slidenum">
+              <a:rPr lang="de-DE" sz="2400" smtClean="0"/>
+              <a:t>21</a:t>
+            </a:fld>
+            <a:endParaRPr lang="de-DE" sz="1600" dirty="0"/>
+          </a:p>
+        </p:txBody>
+      </p:sp>
+      <p:sp>
+        <p:nvSpPr>
+          <p:cNvPr id="5" name="Datumsplatzhalter 4">
+            <a:extLst>
+              <a:ext uri="{FF2B5EF4-FFF2-40B4-BE49-F238E27FC236}">
+                <a16:creationId xmlns:a16="http://schemas.microsoft.com/office/drawing/2014/main" id="{5CADFF1D-BC25-4BF7-9877-2CC77BD54469}"/>
+              </a:ext>
+            </a:extLst>
+          </p:cNvPr>
+          <p:cNvSpPr>
+            <a:spLocks noGrp="1"/>
+          </p:cNvSpPr>
+          <p:nvPr>
+            <p:ph type="dt" sz="half" idx="10"/>
+          </p:nvPr>
+        </p:nvSpPr>
+        <p:spPr>
+          <a:xfrm>
+            <a:off x="0" y="6473050"/>
+            <a:ext cx="2472271" cy="365125"/>
+          </a:xfrm>
+        </p:spPr>
+        <p:txBody>
+          <a:bodyPr/>
+          <a:lstStyle/>
+          <a:p>
+            <a:fld id="{D569A928-58F6-45D5-8F78-96A6F4081ECC}" type="datetime1">
+              <a:rPr lang="de-DE" sz="1200" smtClean="0"/>
+              <a:t>18.01.2018</a:t>
+            </a:fld>
+            <a:endParaRPr lang="de-DE" dirty="0"/>
+          </a:p>
+        </p:txBody>
+      </p:sp>
+      <p:sp>
+        <p:nvSpPr>
+          <p:cNvPr id="7" name="Fußzeilenplatzhalter 6">
+            <a:extLst>
+              <a:ext uri="{FF2B5EF4-FFF2-40B4-BE49-F238E27FC236}">
+                <a16:creationId xmlns:a16="http://schemas.microsoft.com/office/drawing/2014/main" id="{85A3A0C2-EAE0-4572-87C1-BF70B0815FA9}"/>
+              </a:ext>
+            </a:extLst>
+          </p:cNvPr>
+          <p:cNvSpPr>
+            <a:spLocks noGrp="1"/>
+          </p:cNvSpPr>
+          <p:nvPr>
+            <p:ph type="ftr" sz="quarter" idx="11"/>
+          </p:nvPr>
+        </p:nvSpPr>
+        <p:spPr/>
+        <p:txBody>
+          <a:bodyPr/>
+          <a:lstStyle/>
+          <a:p>
+            <a:r>
+              <a:rPr lang="de-DE" sz="1400" dirty="0"/>
+              <a:t>Johann Schröder, Kevin Penner, Michael </a:t>
+            </a:r>
+            <a:r>
+              <a:rPr lang="de-DE" sz="1400" dirty="0" err="1"/>
+              <a:t>Tuszynski</a:t>
+            </a:r>
+            <a:endParaRPr lang="de-DE" sz="1400" dirty="0"/>
+          </a:p>
+        </p:txBody>
+      </p:sp>
+    </p:spTree>
+    <p:extLst>
+      <p:ext uri="{BB962C8B-B14F-4D97-AF65-F5344CB8AC3E}">
+        <p14:creationId xmlns:p14="http://schemas.microsoft.com/office/powerpoint/2010/main" val="1264970260"/>
       </p:ext>
     </p:extLst>
   </p:cSld>
@@ -7412,7 +9553,7 @@
           <a:p>
             <a:fld id="{D569A928-58F6-45D5-8F78-96A6F4081ECC}" type="datetime1">
               <a:rPr lang="de-DE" sz="1200" smtClean="0"/>
-              <a:t>17.01.2018</a:t>
+              <a:t>18.01.2018</a:t>
             </a:fld>
             <a:endParaRPr lang="de-DE" dirty="0"/>
           </a:p>
@@ -7631,7 +9772,7 @@
           <a:p>
             <a:fld id="{8B8ED355-F95A-4BB8-9366-CDBE7FD377DF}" type="datetime1">
               <a:rPr lang="de-DE" sz="1200" smtClean="0"/>
-              <a:t>17.01.2018</a:t>
+              <a:t>18.01.2018</a:t>
             </a:fld>
             <a:endParaRPr lang="de-DE" dirty="0"/>
           </a:p>
@@ -7822,7 +9963,7 @@
           <a:p>
             <a:fld id="{D569A928-58F6-45D5-8F78-96A6F4081ECC}" type="datetime1">
               <a:rPr lang="de-DE" sz="1200" smtClean="0"/>
-              <a:t>17.01.2018</a:t>
+              <a:t>18.01.2018</a:t>
             </a:fld>
             <a:endParaRPr lang="de-DE" dirty="0"/>
           </a:p>
@@ -8043,7 +10184,7 @@
           <a:p>
             <a:fld id="{D569A928-58F6-45D5-8F78-96A6F4081ECC}" type="datetime1">
               <a:rPr lang="de-DE" sz="1200" smtClean="0"/>
-              <a:t>17.01.2018</a:t>
+              <a:t>18.01.2018</a:t>
             </a:fld>
             <a:endParaRPr lang="de-DE" dirty="0"/>
           </a:p>
@@ -8264,7 +10405,7 @@
           <a:p>
             <a:fld id="{D569A928-58F6-45D5-8F78-96A6F4081ECC}" type="datetime1">
               <a:rPr lang="de-DE" sz="1200" smtClean="0"/>
-              <a:t>17.01.2018</a:t>
+              <a:t>18.01.2018</a:t>
             </a:fld>
             <a:endParaRPr lang="de-DE" dirty="0"/>
           </a:p>
@@ -8513,7 +10654,7 @@
           <a:p>
             <a:fld id="{8B8ED355-F95A-4BB8-9366-CDBE7FD377DF}" type="datetime1">
               <a:rPr lang="de-DE" sz="1200" smtClean="0"/>
-              <a:t>17.01.2018</a:t>
+              <a:t>18.01.2018</a:t>
             </a:fld>
             <a:endParaRPr lang="de-DE" dirty="0"/>
           </a:p>
@@ -8704,7 +10845,7 @@
           <a:p>
             <a:fld id="{D569A928-58F6-45D5-8F78-96A6F4081ECC}" type="datetime1">
               <a:rPr lang="de-DE" sz="1200" smtClean="0"/>
-              <a:t>17.01.2018</a:t>
+              <a:t>18.01.2018</a:t>
             </a:fld>
             <a:endParaRPr lang="de-DE" dirty="0"/>
           </a:p>

</xml_diff>